<commit_message>
merge legacy sni spec to sni page
- remove RTOS term
- rename virtual machine to core engine
- remove MicroEJ prefix
- sync startup code snippet from latest microej_main cco
</commit_message>
<xml_diff>
--- a/VEEPortingGuide/images/sni_sync.pptx
+++ b/VEEPortingGuide/images/sni_sync.pptx
@@ -1,19 +1,119 @@
 
 <file path=ppt/presentation.xml><?xml version="1.0" encoding="utf-8"?>
-<p:presentation xmlns:a="http://schemas.openxmlformats.org/drawingml/2006/main" xmlns:p="http://schemas.openxmlformats.org/presentationml/2006/main" xmlns:r="http://schemas.openxmlformats.org/officeDocument/2006/relationships" xmlns:p14="http://schemas.microsoft.com/office/powerpoint/2010/main" xmlns:p15="http://schemas.microsoft.com/office/powerpoint/2012/main" xmlns:mc="http://schemas.openxmlformats.org/markup-compatibility/2006">
+<p:presentation xmlns:a="http://schemas.openxmlformats.org/drawingml/2006/main" xmlns:r="http://schemas.openxmlformats.org/officeDocument/2006/relationships" xmlns:p="http://schemas.openxmlformats.org/presentationml/2006/main">
   <p:sldMasterIdLst>
-    <p:sldMasterId id="2147483648" r:id="rId2"/>
+    <p:sldMasterId id="2147483648" r:id="rId1"/>
   </p:sldMasterIdLst>
   <p:sldIdLst>
-    <p:sldId id="256" r:id="rId3"/>
+    <p:sldId id="256" r:id="rId2"/>
   </p:sldIdLst>
   <p:sldSz cx="12192000" cy="6858000"/>
-  <p:notesSz cx="7559675" cy="10691812"/>
+  <p:notesSz cx="7559675" cy="10691813"/>
+  <p:defaultTextStyle>
+    <a:defPPr>
+      <a:defRPr lang="en-US"/>
+    </a:defPPr>
+    <a:lvl1pPr marL="0" algn="l" defTabSz="914400" rtl="0" eaLnBrk="1" latinLnBrk="0" hangingPunct="1">
+      <a:defRPr sz="1800" kern="1200">
+        <a:solidFill>
+          <a:schemeClr val="tx1"/>
+        </a:solidFill>
+        <a:latin typeface="+mn-lt"/>
+        <a:ea typeface="+mn-ea"/>
+        <a:cs typeface="+mn-cs"/>
+      </a:defRPr>
+    </a:lvl1pPr>
+    <a:lvl2pPr marL="457200" algn="l" defTabSz="914400" rtl="0" eaLnBrk="1" latinLnBrk="0" hangingPunct="1">
+      <a:defRPr sz="1800" kern="1200">
+        <a:solidFill>
+          <a:schemeClr val="tx1"/>
+        </a:solidFill>
+        <a:latin typeface="+mn-lt"/>
+        <a:ea typeface="+mn-ea"/>
+        <a:cs typeface="+mn-cs"/>
+      </a:defRPr>
+    </a:lvl2pPr>
+    <a:lvl3pPr marL="914400" algn="l" defTabSz="914400" rtl="0" eaLnBrk="1" latinLnBrk="0" hangingPunct="1">
+      <a:defRPr sz="1800" kern="1200">
+        <a:solidFill>
+          <a:schemeClr val="tx1"/>
+        </a:solidFill>
+        <a:latin typeface="+mn-lt"/>
+        <a:ea typeface="+mn-ea"/>
+        <a:cs typeface="+mn-cs"/>
+      </a:defRPr>
+    </a:lvl3pPr>
+    <a:lvl4pPr marL="1371600" algn="l" defTabSz="914400" rtl="0" eaLnBrk="1" latinLnBrk="0" hangingPunct="1">
+      <a:defRPr sz="1800" kern="1200">
+        <a:solidFill>
+          <a:schemeClr val="tx1"/>
+        </a:solidFill>
+        <a:latin typeface="+mn-lt"/>
+        <a:ea typeface="+mn-ea"/>
+        <a:cs typeface="+mn-cs"/>
+      </a:defRPr>
+    </a:lvl4pPr>
+    <a:lvl5pPr marL="1828800" algn="l" defTabSz="914400" rtl="0" eaLnBrk="1" latinLnBrk="0" hangingPunct="1">
+      <a:defRPr sz="1800" kern="1200">
+        <a:solidFill>
+          <a:schemeClr val="tx1"/>
+        </a:solidFill>
+        <a:latin typeface="+mn-lt"/>
+        <a:ea typeface="+mn-ea"/>
+        <a:cs typeface="+mn-cs"/>
+      </a:defRPr>
+    </a:lvl5pPr>
+    <a:lvl6pPr marL="2286000" algn="l" defTabSz="914400" rtl="0" eaLnBrk="1" latinLnBrk="0" hangingPunct="1">
+      <a:defRPr sz="1800" kern="1200">
+        <a:solidFill>
+          <a:schemeClr val="tx1"/>
+        </a:solidFill>
+        <a:latin typeface="+mn-lt"/>
+        <a:ea typeface="+mn-ea"/>
+        <a:cs typeface="+mn-cs"/>
+      </a:defRPr>
+    </a:lvl6pPr>
+    <a:lvl7pPr marL="2743200" algn="l" defTabSz="914400" rtl="0" eaLnBrk="1" latinLnBrk="0" hangingPunct="1">
+      <a:defRPr sz="1800" kern="1200">
+        <a:solidFill>
+          <a:schemeClr val="tx1"/>
+        </a:solidFill>
+        <a:latin typeface="+mn-lt"/>
+        <a:ea typeface="+mn-ea"/>
+        <a:cs typeface="+mn-cs"/>
+      </a:defRPr>
+    </a:lvl7pPr>
+    <a:lvl8pPr marL="3200400" algn="l" defTabSz="914400" rtl="0" eaLnBrk="1" latinLnBrk="0" hangingPunct="1">
+      <a:defRPr sz="1800" kern="1200">
+        <a:solidFill>
+          <a:schemeClr val="tx1"/>
+        </a:solidFill>
+        <a:latin typeface="+mn-lt"/>
+        <a:ea typeface="+mn-ea"/>
+        <a:cs typeface="+mn-cs"/>
+      </a:defRPr>
+    </a:lvl8pPr>
+    <a:lvl9pPr marL="3657600" algn="l" defTabSz="914400" rtl="0" eaLnBrk="1" latinLnBrk="0" hangingPunct="1">
+      <a:defRPr sz="1800" kern="1200">
+        <a:solidFill>
+          <a:schemeClr val="tx1"/>
+        </a:solidFill>
+        <a:latin typeface="+mn-lt"/>
+        <a:ea typeface="+mn-ea"/>
+        <a:cs typeface="+mn-cs"/>
+      </a:defRPr>
+    </a:lvl9pPr>
+  </p:defaultTextStyle>
+  <p:extLst>
+    <p:ext uri="{EFAFB233-063F-42B5-8137-9DF3F51BA10A}">
+      <p15:sldGuideLst xmlns:p15="http://schemas.microsoft.com/office/powerpoint/2012/main"/>
+    </p:ext>
+  </p:extLst>
 </p:presentation>
 </file>
 
 <file path=ppt/slideLayouts/slideLayout1.xml><?xml version="1.0" encoding="utf-8"?>
-<p:sldLayout xmlns:a="http://schemas.openxmlformats.org/drawingml/2006/main" xmlns:p="http://schemas.openxmlformats.org/presentationml/2006/main" xmlns:r="http://schemas.openxmlformats.org/officeDocument/2006/relationships" xmlns:p14="http://schemas.microsoft.com/office/powerpoint/2010/main" xmlns:p15="http://schemas.microsoft.com/office/powerpoint/2012/main" xmlns:mc="http://schemas.openxmlformats.org/markup-compatibility/2006" type="blank" preserve="1">
+<p:sldLayout xmlns:a="http://schemas.openxmlformats.org/drawingml/2006/main" xmlns:r="http://schemas.openxmlformats.org/officeDocument/2006/relationships" xmlns:p="http://schemas.openxmlformats.org/presentationml/2006/main" type="blank" preserve="1">
   <p:cSld name="Blank Slide">
     <p:spTree>
       <p:nvGrpSpPr>
@@ -31,11 +131,14 @@
       </p:grpSpPr>
     </p:spTree>
   </p:cSld>
+  <p:clrMapOvr>
+    <a:masterClrMapping/>
+  </p:clrMapOvr>
 </p:sldLayout>
 </file>
 
 <file path=ppt/slideLayouts/slideLayout10.xml><?xml version="1.0" encoding="utf-8"?>
-<p:sldLayout xmlns:a="http://schemas.openxmlformats.org/drawingml/2006/main" xmlns:p="http://schemas.openxmlformats.org/presentationml/2006/main" xmlns:r="http://schemas.openxmlformats.org/officeDocument/2006/relationships" xmlns:p14="http://schemas.microsoft.com/office/powerpoint/2010/main" xmlns:p15="http://schemas.microsoft.com/office/powerpoint/2012/main" xmlns:mc="http://schemas.openxmlformats.org/markup-compatibility/2006" type="objOverTx" preserve="1">
+<p:sldLayout xmlns:a="http://schemas.openxmlformats.org/drawingml/2006/main" xmlns:r="http://schemas.openxmlformats.org/officeDocument/2006/relationships" xmlns:p="http://schemas.openxmlformats.org/presentationml/2006/main" type="objOverTx" preserve="1">
   <p:cSld name="Title, Content over Content">
     <p:spTree>
       <p:nvGrpSpPr>
@@ -71,11 +174,12 @@
           </a:prstGeom>
         </p:spPr>
         <p:txBody>
-          <a:bodyPr lIns="0" rIns="0" tIns="0" bIns="0" anchor="ctr">
+          <a:bodyPr lIns="0" tIns="0" rIns="0" bIns="0" anchor="ctr">
             <a:spAutoFit/>
           </a:bodyPr>
-          <a:p>
-            <a:endParaRPr b="0" lang="en-US" sz="1800" spc="-1" strike="noStrike">
+          <a:lstStyle/>
+          <a:p>
+            <a:endParaRPr lang="en-US" sz="1800" b="0" strike="noStrike" spc="-1">
               <a:solidFill>
                 <a:srgbClr val="000000"/>
               </a:solidFill>
@@ -104,11 +208,12 @@
           </a:prstGeom>
         </p:spPr>
         <p:txBody>
-          <a:bodyPr lIns="0" rIns="0" tIns="0" bIns="0">
+          <a:bodyPr lIns="0" tIns="0" rIns="0" bIns="0">
             <a:normAutofit/>
           </a:bodyPr>
-          <a:p>
-            <a:endParaRPr b="0" lang="en-US" sz="2800" spc="-1" strike="noStrike">
+          <a:lstStyle/>
+          <a:p>
+            <a:endParaRPr lang="en-US" sz="2800" b="0" strike="noStrike" spc="-1">
               <a:solidFill>
                 <a:srgbClr val="000000"/>
               </a:solidFill>
@@ -137,11 +242,12 @@
           </a:prstGeom>
         </p:spPr>
         <p:txBody>
-          <a:bodyPr lIns="0" rIns="0" tIns="0" bIns="0">
+          <a:bodyPr lIns="0" tIns="0" rIns="0" bIns="0">
             <a:normAutofit/>
           </a:bodyPr>
-          <a:p>
-            <a:endParaRPr b="0" lang="en-US" sz="2800" spc="-1" strike="noStrike">
+          <a:lstStyle/>
+          <a:p>
+            <a:endParaRPr lang="en-US" sz="2800" b="0" strike="noStrike" spc="-1">
               <a:solidFill>
                 <a:srgbClr val="000000"/>
               </a:solidFill>
@@ -152,11 +258,14 @@
       </p:sp>
     </p:spTree>
   </p:cSld>
+  <p:clrMapOvr>
+    <a:masterClrMapping/>
+  </p:clrMapOvr>
 </p:sldLayout>
 </file>
 
 <file path=ppt/slideLayouts/slideLayout11.xml><?xml version="1.0" encoding="utf-8"?>
-<p:sldLayout xmlns:a="http://schemas.openxmlformats.org/drawingml/2006/main" xmlns:p="http://schemas.openxmlformats.org/presentationml/2006/main" xmlns:r="http://schemas.openxmlformats.org/officeDocument/2006/relationships" xmlns:p14="http://schemas.microsoft.com/office/powerpoint/2010/main" xmlns:p15="http://schemas.microsoft.com/office/powerpoint/2012/main" xmlns:mc="http://schemas.openxmlformats.org/markup-compatibility/2006" type="fourObj" preserve="1">
+<p:sldLayout xmlns:a="http://schemas.openxmlformats.org/drawingml/2006/main" xmlns:r="http://schemas.openxmlformats.org/officeDocument/2006/relationships" xmlns:p="http://schemas.openxmlformats.org/presentationml/2006/main" type="fourObj" preserve="1">
   <p:cSld name="Title, 4 Content">
     <p:spTree>
       <p:nvGrpSpPr>
@@ -192,11 +301,12 @@
           </a:prstGeom>
         </p:spPr>
         <p:txBody>
-          <a:bodyPr lIns="0" rIns="0" tIns="0" bIns="0" anchor="ctr">
+          <a:bodyPr lIns="0" tIns="0" rIns="0" bIns="0" anchor="ctr">
             <a:spAutoFit/>
           </a:bodyPr>
-          <a:p>
-            <a:endParaRPr b="0" lang="en-US" sz="1800" spc="-1" strike="noStrike">
+          <a:lstStyle/>
+          <a:p>
+            <a:endParaRPr lang="en-US" sz="1800" b="0" strike="noStrike" spc="-1">
               <a:solidFill>
                 <a:srgbClr val="000000"/>
               </a:solidFill>
@@ -225,11 +335,12 @@
           </a:prstGeom>
         </p:spPr>
         <p:txBody>
-          <a:bodyPr lIns="0" rIns="0" tIns="0" bIns="0">
+          <a:bodyPr lIns="0" tIns="0" rIns="0" bIns="0">
             <a:normAutofit/>
           </a:bodyPr>
-          <a:p>
-            <a:endParaRPr b="0" lang="en-US" sz="2800" spc="-1" strike="noStrike">
+          <a:lstStyle/>
+          <a:p>
+            <a:endParaRPr lang="en-US" sz="2800" b="0" strike="noStrike" spc="-1">
               <a:solidFill>
                 <a:srgbClr val="000000"/>
               </a:solidFill>
@@ -258,11 +369,12 @@
           </a:prstGeom>
         </p:spPr>
         <p:txBody>
-          <a:bodyPr lIns="0" rIns="0" tIns="0" bIns="0">
+          <a:bodyPr lIns="0" tIns="0" rIns="0" bIns="0">
             <a:normAutofit/>
           </a:bodyPr>
-          <a:p>
-            <a:endParaRPr b="0" lang="en-US" sz="2800" spc="-1" strike="noStrike">
+          <a:lstStyle/>
+          <a:p>
+            <a:endParaRPr lang="en-US" sz="2800" b="0" strike="noStrike" spc="-1">
               <a:solidFill>
                 <a:srgbClr val="000000"/>
               </a:solidFill>
@@ -291,11 +403,12 @@
           </a:prstGeom>
         </p:spPr>
         <p:txBody>
-          <a:bodyPr lIns="0" rIns="0" tIns="0" bIns="0">
+          <a:bodyPr lIns="0" tIns="0" rIns="0" bIns="0">
             <a:normAutofit/>
           </a:bodyPr>
-          <a:p>
-            <a:endParaRPr b="0" lang="en-US" sz="2800" spc="-1" strike="noStrike">
+          <a:lstStyle/>
+          <a:p>
+            <a:endParaRPr lang="en-US" sz="2800" b="0" strike="noStrike" spc="-1">
               <a:solidFill>
                 <a:srgbClr val="000000"/>
               </a:solidFill>
@@ -324,11 +437,12 @@
           </a:prstGeom>
         </p:spPr>
         <p:txBody>
-          <a:bodyPr lIns="0" rIns="0" tIns="0" bIns="0">
+          <a:bodyPr lIns="0" tIns="0" rIns="0" bIns="0">
             <a:normAutofit/>
           </a:bodyPr>
-          <a:p>
-            <a:endParaRPr b="0" lang="en-US" sz="2800" spc="-1" strike="noStrike">
+          <a:lstStyle/>
+          <a:p>
+            <a:endParaRPr lang="en-US" sz="2800" b="0" strike="noStrike" spc="-1">
               <a:solidFill>
                 <a:srgbClr val="000000"/>
               </a:solidFill>
@@ -339,11 +453,14 @@
       </p:sp>
     </p:spTree>
   </p:cSld>
+  <p:clrMapOvr>
+    <a:masterClrMapping/>
+  </p:clrMapOvr>
 </p:sldLayout>
 </file>
 
 <file path=ppt/slideLayouts/slideLayout12.xml><?xml version="1.0" encoding="utf-8"?>
-<p:sldLayout xmlns:a="http://schemas.openxmlformats.org/drawingml/2006/main" xmlns:p="http://schemas.openxmlformats.org/presentationml/2006/main" xmlns:r="http://schemas.openxmlformats.org/officeDocument/2006/relationships" xmlns:p14="http://schemas.microsoft.com/office/powerpoint/2010/main" xmlns:p15="http://schemas.microsoft.com/office/powerpoint/2012/main" xmlns:mc="http://schemas.openxmlformats.org/markup-compatibility/2006" type="blank" preserve="1">
+<p:sldLayout xmlns:a="http://schemas.openxmlformats.org/drawingml/2006/main" xmlns:r="http://schemas.openxmlformats.org/officeDocument/2006/relationships" xmlns:p="http://schemas.openxmlformats.org/presentationml/2006/main" type="blank" preserve="1">
   <p:cSld name="Title, 6 Content">
     <p:spTree>
       <p:nvGrpSpPr>
@@ -379,11 +496,12 @@
           </a:prstGeom>
         </p:spPr>
         <p:txBody>
-          <a:bodyPr lIns="0" rIns="0" tIns="0" bIns="0" anchor="ctr">
+          <a:bodyPr lIns="0" tIns="0" rIns="0" bIns="0" anchor="ctr">
             <a:spAutoFit/>
           </a:bodyPr>
-          <a:p>
-            <a:endParaRPr b="0" lang="en-US" sz="1800" spc="-1" strike="noStrike">
+          <a:lstStyle/>
+          <a:p>
+            <a:endParaRPr lang="en-US" sz="1800" b="0" strike="noStrike" spc="-1">
               <a:solidFill>
                 <a:srgbClr val="000000"/>
               </a:solidFill>
@@ -412,11 +530,12 @@
           </a:prstGeom>
         </p:spPr>
         <p:txBody>
-          <a:bodyPr lIns="0" rIns="0" tIns="0" bIns="0">
+          <a:bodyPr lIns="0" tIns="0" rIns="0" bIns="0">
             <a:normAutofit/>
           </a:bodyPr>
-          <a:p>
-            <a:endParaRPr b="0" lang="en-US" sz="2800" spc="-1" strike="noStrike">
+          <a:lstStyle/>
+          <a:p>
+            <a:endParaRPr lang="en-US" sz="2800" b="0" strike="noStrike" spc="-1">
               <a:solidFill>
                 <a:srgbClr val="000000"/>
               </a:solidFill>
@@ -445,11 +564,12 @@
           </a:prstGeom>
         </p:spPr>
         <p:txBody>
-          <a:bodyPr lIns="0" rIns="0" tIns="0" bIns="0">
+          <a:bodyPr lIns="0" tIns="0" rIns="0" bIns="0">
             <a:normAutofit/>
           </a:bodyPr>
-          <a:p>
-            <a:endParaRPr b="0" lang="en-US" sz="2800" spc="-1" strike="noStrike">
+          <a:lstStyle/>
+          <a:p>
+            <a:endParaRPr lang="en-US" sz="2800" b="0" strike="noStrike" spc="-1">
               <a:solidFill>
                 <a:srgbClr val="000000"/>
               </a:solidFill>
@@ -478,11 +598,12 @@
           </a:prstGeom>
         </p:spPr>
         <p:txBody>
-          <a:bodyPr lIns="0" rIns="0" tIns="0" bIns="0">
+          <a:bodyPr lIns="0" tIns="0" rIns="0" bIns="0">
             <a:normAutofit/>
           </a:bodyPr>
-          <a:p>
-            <a:endParaRPr b="0" lang="en-US" sz="2800" spc="-1" strike="noStrike">
+          <a:lstStyle/>
+          <a:p>
+            <a:endParaRPr lang="en-US" sz="2800" b="0" strike="noStrike" spc="-1">
               <a:solidFill>
                 <a:srgbClr val="000000"/>
               </a:solidFill>
@@ -511,11 +632,12 @@
           </a:prstGeom>
         </p:spPr>
         <p:txBody>
-          <a:bodyPr lIns="0" rIns="0" tIns="0" bIns="0">
+          <a:bodyPr lIns="0" tIns="0" rIns="0" bIns="0">
             <a:normAutofit/>
           </a:bodyPr>
-          <a:p>
-            <a:endParaRPr b="0" lang="en-US" sz="2800" spc="-1" strike="noStrike">
+          <a:lstStyle/>
+          <a:p>
+            <a:endParaRPr lang="en-US" sz="2800" b="0" strike="noStrike" spc="-1">
               <a:solidFill>
                 <a:srgbClr val="000000"/>
               </a:solidFill>
@@ -544,11 +666,12 @@
           </a:prstGeom>
         </p:spPr>
         <p:txBody>
-          <a:bodyPr lIns="0" rIns="0" tIns="0" bIns="0">
+          <a:bodyPr lIns="0" tIns="0" rIns="0" bIns="0">
             <a:normAutofit/>
           </a:bodyPr>
-          <a:p>
-            <a:endParaRPr b="0" lang="en-US" sz="2800" spc="-1" strike="noStrike">
+          <a:lstStyle/>
+          <a:p>
+            <a:endParaRPr lang="en-US" sz="2800" b="0" strike="noStrike" spc="-1">
               <a:solidFill>
                 <a:srgbClr val="000000"/>
               </a:solidFill>
@@ -577,11 +700,12 @@
           </a:prstGeom>
         </p:spPr>
         <p:txBody>
-          <a:bodyPr lIns="0" rIns="0" tIns="0" bIns="0">
+          <a:bodyPr lIns="0" tIns="0" rIns="0" bIns="0">
             <a:normAutofit/>
           </a:bodyPr>
-          <a:p>
-            <a:endParaRPr b="0" lang="en-US" sz="2800" spc="-1" strike="noStrike">
+          <a:lstStyle/>
+          <a:p>
+            <a:endParaRPr lang="en-US" sz="2800" b="0" strike="noStrike" spc="-1">
               <a:solidFill>
                 <a:srgbClr val="000000"/>
               </a:solidFill>
@@ -592,11 +716,14 @@
       </p:sp>
     </p:spTree>
   </p:cSld>
+  <p:clrMapOvr>
+    <a:masterClrMapping/>
+  </p:clrMapOvr>
 </p:sldLayout>
 </file>
 
 <file path=ppt/slideLayouts/slideLayout2.xml><?xml version="1.0" encoding="utf-8"?>
-<p:sldLayout xmlns:a="http://schemas.openxmlformats.org/drawingml/2006/main" xmlns:p="http://schemas.openxmlformats.org/presentationml/2006/main" xmlns:r="http://schemas.openxmlformats.org/officeDocument/2006/relationships" xmlns:p14="http://schemas.microsoft.com/office/powerpoint/2010/main" xmlns:p15="http://schemas.microsoft.com/office/powerpoint/2012/main" xmlns:mc="http://schemas.openxmlformats.org/markup-compatibility/2006" type="tx" preserve="1">
+<p:sldLayout xmlns:a="http://schemas.openxmlformats.org/drawingml/2006/main" xmlns:r="http://schemas.openxmlformats.org/officeDocument/2006/relationships" xmlns:p="http://schemas.openxmlformats.org/presentationml/2006/main" type="tx" preserve="1">
   <p:cSld name="Title Slide">
     <p:spTree>
       <p:nvGrpSpPr>
@@ -632,11 +759,12 @@
           </a:prstGeom>
         </p:spPr>
         <p:txBody>
-          <a:bodyPr lIns="0" rIns="0" tIns="0" bIns="0" anchor="ctr">
+          <a:bodyPr lIns="0" tIns="0" rIns="0" bIns="0" anchor="ctr">
             <a:spAutoFit/>
           </a:bodyPr>
-          <a:p>
-            <a:endParaRPr b="0" lang="en-US" sz="1800" spc="-1" strike="noStrike">
+          <a:lstStyle/>
+          <a:p>
+            <a:endParaRPr lang="en-US" sz="1800" b="0" strike="noStrike" spc="-1">
               <a:solidFill>
                 <a:srgbClr val="000000"/>
               </a:solidFill>
@@ -665,12 +793,13 @@
           </a:prstGeom>
         </p:spPr>
         <p:txBody>
-          <a:bodyPr lIns="0" rIns="0" tIns="0" bIns="0" anchor="ctr">
+          <a:bodyPr lIns="0" tIns="0" rIns="0" bIns="0" anchor="ctr">
             <a:spAutoFit/>
           </a:bodyPr>
+          <a:lstStyle/>
           <a:p>
             <a:pPr algn="ctr"/>
-            <a:endParaRPr b="0" lang="en-GB" sz="3200" spc="-1" strike="noStrike">
+            <a:endParaRPr lang="en-GB" sz="3200" b="0" strike="noStrike" spc="-1">
               <a:latin typeface="Arial"/>
             </a:endParaRPr>
           </a:p>
@@ -678,11 +807,14 @@
       </p:sp>
     </p:spTree>
   </p:cSld>
+  <p:clrMapOvr>
+    <a:masterClrMapping/>
+  </p:clrMapOvr>
 </p:sldLayout>
 </file>
 
 <file path=ppt/slideLayouts/slideLayout3.xml><?xml version="1.0" encoding="utf-8"?>
-<p:sldLayout xmlns:a="http://schemas.openxmlformats.org/drawingml/2006/main" xmlns:p="http://schemas.openxmlformats.org/presentationml/2006/main" xmlns:r="http://schemas.openxmlformats.org/officeDocument/2006/relationships" xmlns:p14="http://schemas.microsoft.com/office/powerpoint/2010/main" xmlns:p15="http://schemas.microsoft.com/office/powerpoint/2012/main" xmlns:mc="http://schemas.openxmlformats.org/markup-compatibility/2006" type="obj" preserve="1">
+<p:sldLayout xmlns:a="http://schemas.openxmlformats.org/drawingml/2006/main" xmlns:r="http://schemas.openxmlformats.org/officeDocument/2006/relationships" xmlns:p="http://schemas.openxmlformats.org/presentationml/2006/main" type="obj" preserve="1">
   <p:cSld name="Title, Content">
     <p:spTree>
       <p:nvGrpSpPr>
@@ -718,11 +850,12 @@
           </a:prstGeom>
         </p:spPr>
         <p:txBody>
-          <a:bodyPr lIns="0" rIns="0" tIns="0" bIns="0" anchor="ctr">
+          <a:bodyPr lIns="0" tIns="0" rIns="0" bIns="0" anchor="ctr">
             <a:spAutoFit/>
           </a:bodyPr>
-          <a:p>
-            <a:endParaRPr b="0" lang="en-US" sz="1800" spc="-1" strike="noStrike">
+          <a:lstStyle/>
+          <a:p>
+            <a:endParaRPr lang="en-US" sz="1800" b="0" strike="noStrike" spc="-1">
               <a:solidFill>
                 <a:srgbClr val="000000"/>
               </a:solidFill>
@@ -751,11 +884,12 @@
           </a:prstGeom>
         </p:spPr>
         <p:txBody>
-          <a:bodyPr lIns="0" rIns="0" tIns="0" bIns="0">
+          <a:bodyPr lIns="0" tIns="0" rIns="0" bIns="0">
             <a:normAutofit/>
           </a:bodyPr>
-          <a:p>
-            <a:endParaRPr b="0" lang="en-US" sz="2800" spc="-1" strike="noStrike">
+          <a:lstStyle/>
+          <a:p>
+            <a:endParaRPr lang="en-US" sz="2800" b="0" strike="noStrike" spc="-1">
               <a:solidFill>
                 <a:srgbClr val="000000"/>
               </a:solidFill>
@@ -766,11 +900,14 @@
       </p:sp>
     </p:spTree>
   </p:cSld>
+  <p:clrMapOvr>
+    <a:masterClrMapping/>
+  </p:clrMapOvr>
 </p:sldLayout>
 </file>
 
 <file path=ppt/slideLayouts/slideLayout4.xml><?xml version="1.0" encoding="utf-8"?>
-<p:sldLayout xmlns:a="http://schemas.openxmlformats.org/drawingml/2006/main" xmlns:p="http://schemas.openxmlformats.org/presentationml/2006/main" xmlns:r="http://schemas.openxmlformats.org/officeDocument/2006/relationships" xmlns:p14="http://schemas.microsoft.com/office/powerpoint/2010/main" xmlns:p15="http://schemas.microsoft.com/office/powerpoint/2012/main" xmlns:mc="http://schemas.openxmlformats.org/markup-compatibility/2006" type="twoObj" preserve="1">
+<p:sldLayout xmlns:a="http://schemas.openxmlformats.org/drawingml/2006/main" xmlns:r="http://schemas.openxmlformats.org/officeDocument/2006/relationships" xmlns:p="http://schemas.openxmlformats.org/presentationml/2006/main" type="twoObj" preserve="1">
   <p:cSld name="Title, 2 Content">
     <p:spTree>
       <p:nvGrpSpPr>
@@ -806,11 +943,12 @@
           </a:prstGeom>
         </p:spPr>
         <p:txBody>
-          <a:bodyPr lIns="0" rIns="0" tIns="0" bIns="0" anchor="ctr">
+          <a:bodyPr lIns="0" tIns="0" rIns="0" bIns="0" anchor="ctr">
             <a:spAutoFit/>
           </a:bodyPr>
-          <a:p>
-            <a:endParaRPr b="0" lang="en-US" sz="1800" spc="-1" strike="noStrike">
+          <a:lstStyle/>
+          <a:p>
+            <a:endParaRPr lang="en-US" sz="1800" b="0" strike="noStrike" spc="-1">
               <a:solidFill>
                 <a:srgbClr val="000000"/>
               </a:solidFill>
@@ -839,11 +977,12 @@
           </a:prstGeom>
         </p:spPr>
         <p:txBody>
-          <a:bodyPr lIns="0" rIns="0" tIns="0" bIns="0">
+          <a:bodyPr lIns="0" tIns="0" rIns="0" bIns="0">
             <a:normAutofit/>
           </a:bodyPr>
-          <a:p>
-            <a:endParaRPr b="0" lang="en-US" sz="2800" spc="-1" strike="noStrike">
+          <a:lstStyle/>
+          <a:p>
+            <a:endParaRPr lang="en-US" sz="2800" b="0" strike="noStrike" spc="-1">
               <a:solidFill>
                 <a:srgbClr val="000000"/>
               </a:solidFill>
@@ -872,11 +1011,12 @@
           </a:prstGeom>
         </p:spPr>
         <p:txBody>
-          <a:bodyPr lIns="0" rIns="0" tIns="0" bIns="0">
+          <a:bodyPr lIns="0" tIns="0" rIns="0" bIns="0">
             <a:normAutofit/>
           </a:bodyPr>
-          <a:p>
-            <a:endParaRPr b="0" lang="en-US" sz="2800" spc="-1" strike="noStrike">
+          <a:lstStyle/>
+          <a:p>
+            <a:endParaRPr lang="en-US" sz="2800" b="0" strike="noStrike" spc="-1">
               <a:solidFill>
                 <a:srgbClr val="000000"/>
               </a:solidFill>
@@ -887,11 +1027,14 @@
       </p:sp>
     </p:spTree>
   </p:cSld>
+  <p:clrMapOvr>
+    <a:masterClrMapping/>
+  </p:clrMapOvr>
 </p:sldLayout>
 </file>
 
 <file path=ppt/slideLayouts/slideLayout5.xml><?xml version="1.0" encoding="utf-8"?>
-<p:sldLayout xmlns:a="http://schemas.openxmlformats.org/drawingml/2006/main" xmlns:p="http://schemas.openxmlformats.org/presentationml/2006/main" xmlns:r="http://schemas.openxmlformats.org/officeDocument/2006/relationships" xmlns:p14="http://schemas.microsoft.com/office/powerpoint/2010/main" xmlns:p15="http://schemas.microsoft.com/office/powerpoint/2012/main" xmlns:mc="http://schemas.openxmlformats.org/markup-compatibility/2006" type="titleOnly" preserve="1">
+<p:sldLayout xmlns:a="http://schemas.openxmlformats.org/drawingml/2006/main" xmlns:r="http://schemas.openxmlformats.org/officeDocument/2006/relationships" xmlns:p="http://schemas.openxmlformats.org/presentationml/2006/main" type="titleOnly" preserve="1">
   <p:cSld name="Title Only">
     <p:spTree>
       <p:nvGrpSpPr>
@@ -927,11 +1070,12 @@
           </a:prstGeom>
         </p:spPr>
         <p:txBody>
-          <a:bodyPr lIns="0" rIns="0" tIns="0" bIns="0" anchor="ctr">
+          <a:bodyPr lIns="0" tIns="0" rIns="0" bIns="0" anchor="ctr">
             <a:spAutoFit/>
           </a:bodyPr>
-          <a:p>
-            <a:endParaRPr b="0" lang="en-US" sz="1800" spc="-1" strike="noStrike">
+          <a:lstStyle/>
+          <a:p>
+            <a:endParaRPr lang="en-US" sz="1800" b="0" strike="noStrike" spc="-1">
               <a:solidFill>
                 <a:srgbClr val="000000"/>
               </a:solidFill>
@@ -942,11 +1086,14 @@
       </p:sp>
     </p:spTree>
   </p:cSld>
+  <p:clrMapOvr>
+    <a:masterClrMapping/>
+  </p:clrMapOvr>
 </p:sldLayout>
 </file>
 
 <file path=ppt/slideLayouts/slideLayout6.xml><?xml version="1.0" encoding="utf-8"?>
-<p:sldLayout xmlns:a="http://schemas.openxmlformats.org/drawingml/2006/main" xmlns:p="http://schemas.openxmlformats.org/presentationml/2006/main" xmlns:r="http://schemas.openxmlformats.org/officeDocument/2006/relationships" xmlns:p14="http://schemas.microsoft.com/office/powerpoint/2010/main" xmlns:p15="http://schemas.microsoft.com/office/powerpoint/2012/main" xmlns:mc="http://schemas.openxmlformats.org/markup-compatibility/2006" type="objOnly" preserve="1">
+<p:sldLayout xmlns:a="http://schemas.openxmlformats.org/drawingml/2006/main" xmlns:r="http://schemas.openxmlformats.org/officeDocument/2006/relationships" xmlns:p="http://schemas.openxmlformats.org/presentationml/2006/main" type="objOnly" preserve="1">
   <p:cSld name="Centered Text">
     <p:spTree>
       <p:nvGrpSpPr>
@@ -982,12 +1129,13 @@
           </a:prstGeom>
         </p:spPr>
         <p:txBody>
-          <a:bodyPr lIns="0" rIns="0" tIns="0" bIns="0" anchor="ctr">
+          <a:bodyPr lIns="0" tIns="0" rIns="0" bIns="0" anchor="ctr">
             <a:spAutoFit/>
           </a:bodyPr>
+          <a:lstStyle/>
           <a:p>
             <a:pPr algn="ctr"/>
-            <a:endParaRPr b="0" lang="en-GB" sz="3200" spc="-1" strike="noStrike">
+            <a:endParaRPr lang="en-GB" sz="3200" b="0" strike="noStrike" spc="-1">
               <a:latin typeface="Arial"/>
             </a:endParaRPr>
           </a:p>
@@ -995,11 +1143,14 @@
       </p:sp>
     </p:spTree>
   </p:cSld>
+  <p:clrMapOvr>
+    <a:masterClrMapping/>
+  </p:clrMapOvr>
 </p:sldLayout>
 </file>
 
 <file path=ppt/slideLayouts/slideLayout7.xml><?xml version="1.0" encoding="utf-8"?>
-<p:sldLayout xmlns:a="http://schemas.openxmlformats.org/drawingml/2006/main" xmlns:p="http://schemas.openxmlformats.org/presentationml/2006/main" xmlns:r="http://schemas.openxmlformats.org/officeDocument/2006/relationships" xmlns:p14="http://schemas.microsoft.com/office/powerpoint/2010/main" xmlns:p15="http://schemas.microsoft.com/office/powerpoint/2012/main" xmlns:mc="http://schemas.openxmlformats.org/markup-compatibility/2006" type="twoObjAndObj" preserve="1">
+<p:sldLayout xmlns:a="http://schemas.openxmlformats.org/drawingml/2006/main" xmlns:r="http://schemas.openxmlformats.org/officeDocument/2006/relationships" xmlns:p="http://schemas.openxmlformats.org/presentationml/2006/main" type="twoObjAndObj" preserve="1">
   <p:cSld name="Title, 2 Content and Content">
     <p:spTree>
       <p:nvGrpSpPr>
@@ -1035,11 +1186,12 @@
           </a:prstGeom>
         </p:spPr>
         <p:txBody>
-          <a:bodyPr lIns="0" rIns="0" tIns="0" bIns="0" anchor="ctr">
+          <a:bodyPr lIns="0" tIns="0" rIns="0" bIns="0" anchor="ctr">
             <a:spAutoFit/>
           </a:bodyPr>
-          <a:p>
-            <a:endParaRPr b="0" lang="en-US" sz="1800" spc="-1" strike="noStrike">
+          <a:lstStyle/>
+          <a:p>
+            <a:endParaRPr lang="en-US" sz="1800" b="0" strike="noStrike" spc="-1">
               <a:solidFill>
                 <a:srgbClr val="000000"/>
               </a:solidFill>
@@ -1068,11 +1220,12 @@
           </a:prstGeom>
         </p:spPr>
         <p:txBody>
-          <a:bodyPr lIns="0" rIns="0" tIns="0" bIns="0">
+          <a:bodyPr lIns="0" tIns="0" rIns="0" bIns="0">
             <a:normAutofit/>
           </a:bodyPr>
-          <a:p>
-            <a:endParaRPr b="0" lang="en-US" sz="2800" spc="-1" strike="noStrike">
+          <a:lstStyle/>
+          <a:p>
+            <a:endParaRPr lang="en-US" sz="2800" b="0" strike="noStrike" spc="-1">
               <a:solidFill>
                 <a:srgbClr val="000000"/>
               </a:solidFill>
@@ -1101,11 +1254,12 @@
           </a:prstGeom>
         </p:spPr>
         <p:txBody>
-          <a:bodyPr lIns="0" rIns="0" tIns="0" bIns="0">
+          <a:bodyPr lIns="0" tIns="0" rIns="0" bIns="0">
             <a:normAutofit/>
           </a:bodyPr>
-          <a:p>
-            <a:endParaRPr b="0" lang="en-US" sz="2800" spc="-1" strike="noStrike">
+          <a:lstStyle/>
+          <a:p>
+            <a:endParaRPr lang="en-US" sz="2800" b="0" strike="noStrike" spc="-1">
               <a:solidFill>
                 <a:srgbClr val="000000"/>
               </a:solidFill>
@@ -1134,11 +1288,12 @@
           </a:prstGeom>
         </p:spPr>
         <p:txBody>
-          <a:bodyPr lIns="0" rIns="0" tIns="0" bIns="0">
+          <a:bodyPr lIns="0" tIns="0" rIns="0" bIns="0">
             <a:normAutofit/>
           </a:bodyPr>
-          <a:p>
-            <a:endParaRPr b="0" lang="en-US" sz="2800" spc="-1" strike="noStrike">
+          <a:lstStyle/>
+          <a:p>
+            <a:endParaRPr lang="en-US" sz="2800" b="0" strike="noStrike" spc="-1">
               <a:solidFill>
                 <a:srgbClr val="000000"/>
               </a:solidFill>
@@ -1149,11 +1304,14 @@
       </p:sp>
     </p:spTree>
   </p:cSld>
+  <p:clrMapOvr>
+    <a:masterClrMapping/>
+  </p:clrMapOvr>
 </p:sldLayout>
 </file>
 
 <file path=ppt/slideLayouts/slideLayout8.xml><?xml version="1.0" encoding="utf-8"?>
-<p:sldLayout xmlns:a="http://schemas.openxmlformats.org/drawingml/2006/main" xmlns:p="http://schemas.openxmlformats.org/presentationml/2006/main" xmlns:r="http://schemas.openxmlformats.org/officeDocument/2006/relationships" xmlns:p14="http://schemas.microsoft.com/office/powerpoint/2010/main" xmlns:p15="http://schemas.microsoft.com/office/powerpoint/2012/main" xmlns:mc="http://schemas.openxmlformats.org/markup-compatibility/2006" type="objAndTwoObj" preserve="1">
+<p:sldLayout xmlns:a="http://schemas.openxmlformats.org/drawingml/2006/main" xmlns:r="http://schemas.openxmlformats.org/officeDocument/2006/relationships" xmlns:p="http://schemas.openxmlformats.org/presentationml/2006/main" type="objAndTwoObj" preserve="1">
   <p:cSld name="Title Content and 2 Content">
     <p:spTree>
       <p:nvGrpSpPr>
@@ -1189,11 +1347,12 @@
           </a:prstGeom>
         </p:spPr>
         <p:txBody>
-          <a:bodyPr lIns="0" rIns="0" tIns="0" bIns="0" anchor="ctr">
+          <a:bodyPr lIns="0" tIns="0" rIns="0" bIns="0" anchor="ctr">
             <a:spAutoFit/>
           </a:bodyPr>
-          <a:p>
-            <a:endParaRPr b="0" lang="en-US" sz="1800" spc="-1" strike="noStrike">
+          <a:lstStyle/>
+          <a:p>
+            <a:endParaRPr lang="en-US" sz="1800" b="0" strike="noStrike" spc="-1">
               <a:solidFill>
                 <a:srgbClr val="000000"/>
               </a:solidFill>
@@ -1222,11 +1381,12 @@
           </a:prstGeom>
         </p:spPr>
         <p:txBody>
-          <a:bodyPr lIns="0" rIns="0" tIns="0" bIns="0">
+          <a:bodyPr lIns="0" tIns="0" rIns="0" bIns="0">
             <a:normAutofit/>
           </a:bodyPr>
-          <a:p>
-            <a:endParaRPr b="0" lang="en-US" sz="2800" spc="-1" strike="noStrike">
+          <a:lstStyle/>
+          <a:p>
+            <a:endParaRPr lang="en-US" sz="2800" b="0" strike="noStrike" spc="-1">
               <a:solidFill>
                 <a:srgbClr val="000000"/>
               </a:solidFill>
@@ -1255,11 +1415,12 @@
           </a:prstGeom>
         </p:spPr>
         <p:txBody>
-          <a:bodyPr lIns="0" rIns="0" tIns="0" bIns="0">
+          <a:bodyPr lIns="0" tIns="0" rIns="0" bIns="0">
             <a:normAutofit/>
           </a:bodyPr>
-          <a:p>
-            <a:endParaRPr b="0" lang="en-US" sz="2800" spc="-1" strike="noStrike">
+          <a:lstStyle/>
+          <a:p>
+            <a:endParaRPr lang="en-US" sz="2800" b="0" strike="noStrike" spc="-1">
               <a:solidFill>
                 <a:srgbClr val="000000"/>
               </a:solidFill>
@@ -1288,11 +1449,12 @@
           </a:prstGeom>
         </p:spPr>
         <p:txBody>
-          <a:bodyPr lIns="0" rIns="0" tIns="0" bIns="0">
+          <a:bodyPr lIns="0" tIns="0" rIns="0" bIns="0">
             <a:normAutofit/>
           </a:bodyPr>
-          <a:p>
-            <a:endParaRPr b="0" lang="en-US" sz="2800" spc="-1" strike="noStrike">
+          <a:lstStyle/>
+          <a:p>
+            <a:endParaRPr lang="en-US" sz="2800" b="0" strike="noStrike" spc="-1">
               <a:solidFill>
                 <a:srgbClr val="000000"/>
               </a:solidFill>
@@ -1303,11 +1465,14 @@
       </p:sp>
     </p:spTree>
   </p:cSld>
+  <p:clrMapOvr>
+    <a:masterClrMapping/>
+  </p:clrMapOvr>
 </p:sldLayout>
 </file>
 
 <file path=ppt/slideLayouts/slideLayout9.xml><?xml version="1.0" encoding="utf-8"?>
-<p:sldLayout xmlns:a="http://schemas.openxmlformats.org/drawingml/2006/main" xmlns:p="http://schemas.openxmlformats.org/presentationml/2006/main" xmlns:r="http://schemas.openxmlformats.org/officeDocument/2006/relationships" xmlns:p14="http://schemas.microsoft.com/office/powerpoint/2010/main" xmlns:p15="http://schemas.microsoft.com/office/powerpoint/2012/main" xmlns:mc="http://schemas.openxmlformats.org/markup-compatibility/2006" type="twoObjOverTx" preserve="1">
+<p:sldLayout xmlns:a="http://schemas.openxmlformats.org/drawingml/2006/main" xmlns:r="http://schemas.openxmlformats.org/officeDocument/2006/relationships" xmlns:p="http://schemas.openxmlformats.org/presentationml/2006/main" type="twoObjOverTx" preserve="1">
   <p:cSld name="Title, 2 Content over Content">
     <p:spTree>
       <p:nvGrpSpPr>
@@ -1343,11 +1508,12 @@
           </a:prstGeom>
         </p:spPr>
         <p:txBody>
-          <a:bodyPr lIns="0" rIns="0" tIns="0" bIns="0" anchor="ctr">
+          <a:bodyPr lIns="0" tIns="0" rIns="0" bIns="0" anchor="ctr">
             <a:spAutoFit/>
           </a:bodyPr>
-          <a:p>
-            <a:endParaRPr b="0" lang="en-US" sz="1800" spc="-1" strike="noStrike">
+          <a:lstStyle/>
+          <a:p>
+            <a:endParaRPr lang="en-US" sz="1800" b="0" strike="noStrike" spc="-1">
               <a:solidFill>
                 <a:srgbClr val="000000"/>
               </a:solidFill>
@@ -1376,11 +1542,12 @@
           </a:prstGeom>
         </p:spPr>
         <p:txBody>
-          <a:bodyPr lIns="0" rIns="0" tIns="0" bIns="0">
+          <a:bodyPr lIns="0" tIns="0" rIns="0" bIns="0">
             <a:normAutofit/>
           </a:bodyPr>
-          <a:p>
-            <a:endParaRPr b="0" lang="en-US" sz="2800" spc="-1" strike="noStrike">
+          <a:lstStyle/>
+          <a:p>
+            <a:endParaRPr lang="en-US" sz="2800" b="0" strike="noStrike" spc="-1">
               <a:solidFill>
                 <a:srgbClr val="000000"/>
               </a:solidFill>
@@ -1409,11 +1576,12 @@
           </a:prstGeom>
         </p:spPr>
         <p:txBody>
-          <a:bodyPr lIns="0" rIns="0" tIns="0" bIns="0">
+          <a:bodyPr lIns="0" tIns="0" rIns="0" bIns="0">
             <a:normAutofit/>
           </a:bodyPr>
-          <a:p>
-            <a:endParaRPr b="0" lang="en-US" sz="2800" spc="-1" strike="noStrike">
+          <a:lstStyle/>
+          <a:p>
+            <a:endParaRPr lang="en-US" sz="2800" b="0" strike="noStrike" spc="-1">
               <a:solidFill>
                 <a:srgbClr val="000000"/>
               </a:solidFill>
@@ -1442,11 +1610,12 @@
           </a:prstGeom>
         </p:spPr>
         <p:txBody>
-          <a:bodyPr lIns="0" rIns="0" tIns="0" bIns="0">
+          <a:bodyPr lIns="0" tIns="0" rIns="0" bIns="0">
             <a:normAutofit/>
           </a:bodyPr>
-          <a:p>
-            <a:endParaRPr b="0" lang="en-US" sz="2800" spc="-1" strike="noStrike">
+          <a:lstStyle/>
+          <a:p>
+            <a:endParaRPr lang="en-US" sz="2800" b="0" strike="noStrike" spc="-1">
               <a:solidFill>
                 <a:srgbClr val="000000"/>
               </a:solidFill>
@@ -1457,17 +1626,21 @@
       </p:sp>
     </p:spTree>
   </p:cSld>
+  <p:clrMapOvr>
+    <a:masterClrMapping/>
+  </p:clrMapOvr>
 </p:sldLayout>
 </file>
 
 <file path=ppt/slideMasters/slideMaster1.xml><?xml version="1.0" encoding="utf-8"?>
-<p:sldMaster xmlns:a="http://schemas.openxmlformats.org/drawingml/2006/main" xmlns:p="http://schemas.openxmlformats.org/presentationml/2006/main" xmlns:r="http://schemas.openxmlformats.org/officeDocument/2006/relationships" xmlns:p14="http://schemas.microsoft.com/office/powerpoint/2010/main" xmlns:p15="http://schemas.microsoft.com/office/powerpoint/2012/main" xmlns:mc="http://schemas.openxmlformats.org/markup-compatibility/2006">
+<p:sldMaster xmlns:a="http://schemas.openxmlformats.org/drawingml/2006/main" xmlns:r="http://schemas.openxmlformats.org/officeDocument/2006/relationships" xmlns:p="http://schemas.openxmlformats.org/presentationml/2006/main">
   <p:cSld>
     <p:bg>
       <p:bgPr>
         <a:solidFill>
-          <a:srgbClr val="ffffff"/>
+          <a:srgbClr val="FFFFFF"/>
         </a:solidFill>
+        <a:effectLst/>
       </p:bgPr>
     </p:bg>
     <p:spTree>
@@ -1486,7 +1659,7 @@
       </p:grpSpPr>
       <p:sp>
         <p:nvSpPr>
-          <p:cNvPr id="0" name="PlaceHolder 1"/>
+          <p:cNvPr id="4" name="PlaceHolder 1"/>
           <p:cNvSpPr>
             <a:spLocks noGrp="1"/>
           </p:cNvSpPr>
@@ -1507,6 +1680,7 @@
           <a:bodyPr anchor="b">
             <a:noAutofit/>
           </a:bodyPr>
+          <a:lstStyle/>
           <a:p>
             <a:pPr algn="ctr">
               <a:lnSpc>
@@ -1514,7 +1688,7 @@
               </a:lnSpc>
             </a:pPr>
             <a:r>
-              <a:rPr b="0" lang="en-US" sz="6000" spc="-1" strike="noStrike">
+              <a:rPr lang="en-US" sz="6000" b="0" strike="noStrike" spc="-1">
                 <a:solidFill>
                   <a:srgbClr val="000000"/>
                 </a:solidFill>
@@ -1522,7 +1696,7 @@
               </a:rPr>
               <a:t>Click to edit Master title style</a:t>
             </a:r>
-            <a:endParaRPr b="0" lang="en-US" sz="6000" spc="-1" strike="noStrike">
+            <a:endParaRPr lang="en-US" sz="6000" b="0" strike="noStrike" spc="-1">
               <a:solidFill>
                 <a:srgbClr val="000000"/>
               </a:solidFill>
@@ -1533,7 +1707,7 @@
       </p:sp>
       <p:sp>
         <p:nvSpPr>
-          <p:cNvPr id="1" name="PlaceHolder 2"/>
+          <p:cNvPr id="5" name="PlaceHolder 2"/>
           <p:cNvSpPr>
             <a:spLocks noGrp="1"/>
           </p:cNvSpPr>
@@ -1554,6 +1728,7 @@
           <a:bodyPr anchor="ctr">
             <a:noAutofit/>
           </a:bodyPr>
+          <a:lstStyle/>
           <a:p>
             <a:pPr>
               <a:lnSpc>
@@ -1561,15 +1736,15 @@
               </a:lnSpc>
             </a:pPr>
             <a:fld id="{923B539C-E758-4EB0-A847-43819CC53FB9}" type="datetime">
-              <a:rPr b="0" lang="en-GB" sz="1200" spc="-1" strike="noStrike">
+              <a:rPr lang="en-GB" sz="1200" b="0" strike="noStrike" spc="-1">
                 <a:solidFill>
-                  <a:srgbClr val="8b8b8b"/>
+                  <a:srgbClr val="8B8B8B"/>
                 </a:solidFill>
                 <a:latin typeface="Calibri"/>
               </a:rPr>
-              <a:t>12/10/20</a:t>
+              <a:t>18/09/2024</a:t>
             </a:fld>
-            <a:endParaRPr b="0" lang="en-GB" sz="1200" spc="-1" strike="noStrike">
+            <a:endParaRPr lang="en-GB" sz="1200" b="0" strike="noStrike" spc="-1">
               <a:latin typeface="Times New Roman"/>
             </a:endParaRPr>
           </a:p>
@@ -1598,8 +1773,9 @@
           <a:bodyPr anchor="ctr">
             <a:noAutofit/>
           </a:bodyPr>
-          <a:p>
-            <a:endParaRPr b="0" lang="en-GB" sz="2400" spc="-1" strike="noStrike">
+          <a:lstStyle/>
+          <a:p>
+            <a:endParaRPr lang="en-GB" sz="2400" b="0" strike="noStrike" spc="-1">
               <a:latin typeface="Times New Roman"/>
             </a:endParaRPr>
           </a:p>
@@ -1628,6 +1804,7 @@
           <a:bodyPr anchor="ctr">
             <a:noAutofit/>
           </a:bodyPr>
+          <a:lstStyle/>
           <a:p>
             <a:pPr algn="r">
               <a:lnSpc>
@@ -1635,15 +1812,15 @@
               </a:lnSpc>
             </a:pPr>
             <a:fld id="{440C4DF1-1809-4856-8143-E1C507DC3232}" type="slidenum">
-              <a:rPr b="0" lang="en-GB" sz="1200" spc="-1" strike="noStrike">
+              <a:rPr lang="en-GB" sz="1200" b="0" strike="noStrike" spc="-1">
                 <a:solidFill>
-                  <a:srgbClr val="8b8b8b"/>
+                  <a:srgbClr val="8B8B8B"/>
                 </a:solidFill>
                 <a:latin typeface="Calibri"/>
               </a:rPr>
-              <a:t>&lt;number&gt;</a:t>
+              <a:t>‹#›</a:t>
             </a:fld>
-            <a:endParaRPr b="0" lang="en-GB" sz="1200" spc="-1" strike="noStrike">
+            <a:endParaRPr lang="en-GB" sz="1200" b="0" strike="noStrike" spc="-1">
               <a:latin typeface="Times New Roman"/>
             </a:endParaRPr>
           </a:p>
@@ -1651,26 +1828,306 @@
       </p:sp>
     </p:spTree>
   </p:cSld>
-  <p:clrMap bg1="lt1" bg2="lt2" tx1="dk1" tx2="dk2" accent1="accent1" accent2="accent2" accent3="accent3" accent4="accent4" accent5="accent5" accent6="accent6" hlink="hlink" folHlink="folHlink"/>
+  <p:clrMap bg1="lt1" tx1="dk1" bg2="lt2" tx2="dk2" accent1="accent1" accent2="accent2" accent3="accent3" accent4="accent4" accent5="accent5" accent6="accent6" hlink="hlink" folHlink="folHlink"/>
   <p:sldLayoutIdLst>
-    <p:sldLayoutId id="2147483649" r:id="rId2"/>
-    <p:sldLayoutId id="2147483650" r:id="rId3"/>
-    <p:sldLayoutId id="2147483651" r:id="rId4"/>
-    <p:sldLayoutId id="2147483652" r:id="rId5"/>
-    <p:sldLayoutId id="2147483653" r:id="rId6"/>
-    <p:sldLayoutId id="2147483654" r:id="rId7"/>
-    <p:sldLayoutId id="2147483655" r:id="rId8"/>
-    <p:sldLayoutId id="2147483656" r:id="rId9"/>
-    <p:sldLayoutId id="2147483657" r:id="rId10"/>
-    <p:sldLayoutId id="2147483658" r:id="rId11"/>
-    <p:sldLayoutId id="2147483659" r:id="rId12"/>
-    <p:sldLayoutId id="2147483660" r:id="rId13"/>
+    <p:sldLayoutId id="2147483649" r:id="rId1"/>
+    <p:sldLayoutId id="2147483650" r:id="rId2"/>
+    <p:sldLayoutId id="2147483651" r:id="rId3"/>
+    <p:sldLayoutId id="2147483652" r:id="rId4"/>
+    <p:sldLayoutId id="2147483653" r:id="rId5"/>
+    <p:sldLayoutId id="2147483654" r:id="rId6"/>
+    <p:sldLayoutId id="2147483655" r:id="rId7"/>
+    <p:sldLayoutId id="2147483656" r:id="rId8"/>
+    <p:sldLayoutId id="2147483657" r:id="rId9"/>
+    <p:sldLayoutId id="2147483658" r:id="rId10"/>
+    <p:sldLayoutId id="2147483659" r:id="rId11"/>
+    <p:sldLayoutId id="2147483660" r:id="rId12"/>
   </p:sldLayoutIdLst>
+  <p:txStyles>
+    <p:titleStyle>
+      <a:lvl1pPr algn="l" defTabSz="914400" rtl="0" eaLnBrk="1" latinLnBrk="0" hangingPunct="1">
+        <a:lnSpc>
+          <a:spcPct val="90000"/>
+        </a:lnSpc>
+        <a:spcBef>
+          <a:spcPct val="0"/>
+        </a:spcBef>
+        <a:buNone/>
+        <a:defRPr sz="4400" kern="1200">
+          <a:solidFill>
+            <a:schemeClr val="tx1"/>
+          </a:solidFill>
+          <a:latin typeface="+mj-lt"/>
+          <a:ea typeface="+mj-ea"/>
+          <a:cs typeface="+mj-cs"/>
+        </a:defRPr>
+      </a:lvl1pPr>
+    </p:titleStyle>
+    <p:bodyStyle>
+      <a:lvl1pPr marL="228600" indent="-228600" algn="l" defTabSz="914400" rtl="0" eaLnBrk="1" latinLnBrk="0" hangingPunct="1">
+        <a:lnSpc>
+          <a:spcPct val="90000"/>
+        </a:lnSpc>
+        <a:spcBef>
+          <a:spcPts val="1000"/>
+        </a:spcBef>
+        <a:buFont typeface="Arial" panose="020B0604020202020204" pitchFamily="34" charset="0"/>
+        <a:buChar char="•"/>
+        <a:defRPr sz="2800" kern="1200">
+          <a:solidFill>
+            <a:schemeClr val="tx1"/>
+          </a:solidFill>
+          <a:latin typeface="+mn-lt"/>
+          <a:ea typeface="+mn-ea"/>
+          <a:cs typeface="+mn-cs"/>
+        </a:defRPr>
+      </a:lvl1pPr>
+      <a:lvl2pPr marL="685800" indent="-228600" algn="l" defTabSz="914400" rtl="0" eaLnBrk="1" latinLnBrk="0" hangingPunct="1">
+        <a:lnSpc>
+          <a:spcPct val="90000"/>
+        </a:lnSpc>
+        <a:spcBef>
+          <a:spcPts val="500"/>
+        </a:spcBef>
+        <a:buFont typeface="Arial" panose="020B0604020202020204" pitchFamily="34" charset="0"/>
+        <a:buChar char="•"/>
+        <a:defRPr sz="2400" kern="1200">
+          <a:solidFill>
+            <a:schemeClr val="tx1"/>
+          </a:solidFill>
+          <a:latin typeface="+mn-lt"/>
+          <a:ea typeface="+mn-ea"/>
+          <a:cs typeface="+mn-cs"/>
+        </a:defRPr>
+      </a:lvl2pPr>
+      <a:lvl3pPr marL="1143000" indent="-228600" algn="l" defTabSz="914400" rtl="0" eaLnBrk="1" latinLnBrk="0" hangingPunct="1">
+        <a:lnSpc>
+          <a:spcPct val="90000"/>
+        </a:lnSpc>
+        <a:spcBef>
+          <a:spcPts val="500"/>
+        </a:spcBef>
+        <a:buFont typeface="Arial" panose="020B0604020202020204" pitchFamily="34" charset="0"/>
+        <a:buChar char="•"/>
+        <a:defRPr sz="2000" kern="1200">
+          <a:solidFill>
+            <a:schemeClr val="tx1"/>
+          </a:solidFill>
+          <a:latin typeface="+mn-lt"/>
+          <a:ea typeface="+mn-ea"/>
+          <a:cs typeface="+mn-cs"/>
+        </a:defRPr>
+      </a:lvl3pPr>
+      <a:lvl4pPr marL="1600200" indent="-228600" algn="l" defTabSz="914400" rtl="0" eaLnBrk="1" latinLnBrk="0" hangingPunct="1">
+        <a:lnSpc>
+          <a:spcPct val="90000"/>
+        </a:lnSpc>
+        <a:spcBef>
+          <a:spcPts val="500"/>
+        </a:spcBef>
+        <a:buFont typeface="Arial" panose="020B0604020202020204" pitchFamily="34" charset="0"/>
+        <a:buChar char="•"/>
+        <a:defRPr sz="1800" kern="1200">
+          <a:solidFill>
+            <a:schemeClr val="tx1"/>
+          </a:solidFill>
+          <a:latin typeface="+mn-lt"/>
+          <a:ea typeface="+mn-ea"/>
+          <a:cs typeface="+mn-cs"/>
+        </a:defRPr>
+      </a:lvl4pPr>
+      <a:lvl5pPr marL="2057400" indent="-228600" algn="l" defTabSz="914400" rtl="0" eaLnBrk="1" latinLnBrk="0" hangingPunct="1">
+        <a:lnSpc>
+          <a:spcPct val="90000"/>
+        </a:lnSpc>
+        <a:spcBef>
+          <a:spcPts val="500"/>
+        </a:spcBef>
+        <a:buFont typeface="Arial" panose="020B0604020202020204" pitchFamily="34" charset="0"/>
+        <a:buChar char="•"/>
+        <a:defRPr sz="1800" kern="1200">
+          <a:solidFill>
+            <a:schemeClr val="tx1"/>
+          </a:solidFill>
+          <a:latin typeface="+mn-lt"/>
+          <a:ea typeface="+mn-ea"/>
+          <a:cs typeface="+mn-cs"/>
+        </a:defRPr>
+      </a:lvl5pPr>
+      <a:lvl6pPr marL="2514600" indent="-228600" algn="l" defTabSz="914400" rtl="0" eaLnBrk="1" latinLnBrk="0" hangingPunct="1">
+        <a:lnSpc>
+          <a:spcPct val="90000"/>
+        </a:lnSpc>
+        <a:spcBef>
+          <a:spcPts val="500"/>
+        </a:spcBef>
+        <a:buFont typeface="Arial" panose="020B0604020202020204" pitchFamily="34" charset="0"/>
+        <a:buChar char="•"/>
+        <a:defRPr sz="1800" kern="1200">
+          <a:solidFill>
+            <a:schemeClr val="tx1"/>
+          </a:solidFill>
+          <a:latin typeface="+mn-lt"/>
+          <a:ea typeface="+mn-ea"/>
+          <a:cs typeface="+mn-cs"/>
+        </a:defRPr>
+      </a:lvl6pPr>
+      <a:lvl7pPr marL="2971800" indent="-228600" algn="l" defTabSz="914400" rtl="0" eaLnBrk="1" latinLnBrk="0" hangingPunct="1">
+        <a:lnSpc>
+          <a:spcPct val="90000"/>
+        </a:lnSpc>
+        <a:spcBef>
+          <a:spcPts val="500"/>
+        </a:spcBef>
+        <a:buFont typeface="Arial" panose="020B0604020202020204" pitchFamily="34" charset="0"/>
+        <a:buChar char="•"/>
+        <a:defRPr sz="1800" kern="1200">
+          <a:solidFill>
+            <a:schemeClr val="tx1"/>
+          </a:solidFill>
+          <a:latin typeface="+mn-lt"/>
+          <a:ea typeface="+mn-ea"/>
+          <a:cs typeface="+mn-cs"/>
+        </a:defRPr>
+      </a:lvl7pPr>
+      <a:lvl8pPr marL="3429000" indent="-228600" algn="l" defTabSz="914400" rtl="0" eaLnBrk="1" latinLnBrk="0" hangingPunct="1">
+        <a:lnSpc>
+          <a:spcPct val="90000"/>
+        </a:lnSpc>
+        <a:spcBef>
+          <a:spcPts val="500"/>
+        </a:spcBef>
+        <a:buFont typeface="Arial" panose="020B0604020202020204" pitchFamily="34" charset="0"/>
+        <a:buChar char="•"/>
+        <a:defRPr sz="1800" kern="1200">
+          <a:solidFill>
+            <a:schemeClr val="tx1"/>
+          </a:solidFill>
+          <a:latin typeface="+mn-lt"/>
+          <a:ea typeface="+mn-ea"/>
+          <a:cs typeface="+mn-cs"/>
+        </a:defRPr>
+      </a:lvl8pPr>
+      <a:lvl9pPr marL="3886200" indent="-228600" algn="l" defTabSz="914400" rtl="0" eaLnBrk="1" latinLnBrk="0" hangingPunct="1">
+        <a:lnSpc>
+          <a:spcPct val="90000"/>
+        </a:lnSpc>
+        <a:spcBef>
+          <a:spcPts val="500"/>
+        </a:spcBef>
+        <a:buFont typeface="Arial" panose="020B0604020202020204" pitchFamily="34" charset="0"/>
+        <a:buChar char="•"/>
+        <a:defRPr sz="1800" kern="1200">
+          <a:solidFill>
+            <a:schemeClr val="tx1"/>
+          </a:solidFill>
+          <a:latin typeface="+mn-lt"/>
+          <a:ea typeface="+mn-ea"/>
+          <a:cs typeface="+mn-cs"/>
+        </a:defRPr>
+      </a:lvl9pPr>
+    </p:bodyStyle>
+    <p:otherStyle>
+      <a:defPPr>
+        <a:defRPr lang="en-US"/>
+      </a:defPPr>
+      <a:lvl1pPr marL="0" algn="l" defTabSz="914400" rtl="0" eaLnBrk="1" latinLnBrk="0" hangingPunct="1">
+        <a:defRPr sz="1800" kern="1200">
+          <a:solidFill>
+            <a:schemeClr val="tx1"/>
+          </a:solidFill>
+          <a:latin typeface="+mn-lt"/>
+          <a:ea typeface="+mn-ea"/>
+          <a:cs typeface="+mn-cs"/>
+        </a:defRPr>
+      </a:lvl1pPr>
+      <a:lvl2pPr marL="457200" algn="l" defTabSz="914400" rtl="0" eaLnBrk="1" latinLnBrk="0" hangingPunct="1">
+        <a:defRPr sz="1800" kern="1200">
+          <a:solidFill>
+            <a:schemeClr val="tx1"/>
+          </a:solidFill>
+          <a:latin typeface="+mn-lt"/>
+          <a:ea typeface="+mn-ea"/>
+          <a:cs typeface="+mn-cs"/>
+        </a:defRPr>
+      </a:lvl2pPr>
+      <a:lvl3pPr marL="914400" algn="l" defTabSz="914400" rtl="0" eaLnBrk="1" latinLnBrk="0" hangingPunct="1">
+        <a:defRPr sz="1800" kern="1200">
+          <a:solidFill>
+            <a:schemeClr val="tx1"/>
+          </a:solidFill>
+          <a:latin typeface="+mn-lt"/>
+          <a:ea typeface="+mn-ea"/>
+          <a:cs typeface="+mn-cs"/>
+        </a:defRPr>
+      </a:lvl3pPr>
+      <a:lvl4pPr marL="1371600" algn="l" defTabSz="914400" rtl="0" eaLnBrk="1" latinLnBrk="0" hangingPunct="1">
+        <a:defRPr sz="1800" kern="1200">
+          <a:solidFill>
+            <a:schemeClr val="tx1"/>
+          </a:solidFill>
+          <a:latin typeface="+mn-lt"/>
+          <a:ea typeface="+mn-ea"/>
+          <a:cs typeface="+mn-cs"/>
+        </a:defRPr>
+      </a:lvl4pPr>
+      <a:lvl5pPr marL="1828800" algn="l" defTabSz="914400" rtl="0" eaLnBrk="1" latinLnBrk="0" hangingPunct="1">
+        <a:defRPr sz="1800" kern="1200">
+          <a:solidFill>
+            <a:schemeClr val="tx1"/>
+          </a:solidFill>
+          <a:latin typeface="+mn-lt"/>
+          <a:ea typeface="+mn-ea"/>
+          <a:cs typeface="+mn-cs"/>
+        </a:defRPr>
+      </a:lvl5pPr>
+      <a:lvl6pPr marL="2286000" algn="l" defTabSz="914400" rtl="0" eaLnBrk="1" latinLnBrk="0" hangingPunct="1">
+        <a:defRPr sz="1800" kern="1200">
+          <a:solidFill>
+            <a:schemeClr val="tx1"/>
+          </a:solidFill>
+          <a:latin typeface="+mn-lt"/>
+          <a:ea typeface="+mn-ea"/>
+          <a:cs typeface="+mn-cs"/>
+        </a:defRPr>
+      </a:lvl6pPr>
+      <a:lvl7pPr marL="2743200" algn="l" defTabSz="914400" rtl="0" eaLnBrk="1" latinLnBrk="0" hangingPunct="1">
+        <a:defRPr sz="1800" kern="1200">
+          <a:solidFill>
+            <a:schemeClr val="tx1"/>
+          </a:solidFill>
+          <a:latin typeface="+mn-lt"/>
+          <a:ea typeface="+mn-ea"/>
+          <a:cs typeface="+mn-cs"/>
+        </a:defRPr>
+      </a:lvl7pPr>
+      <a:lvl8pPr marL="3200400" algn="l" defTabSz="914400" rtl="0" eaLnBrk="1" latinLnBrk="0" hangingPunct="1">
+        <a:defRPr sz="1800" kern="1200">
+          <a:solidFill>
+            <a:schemeClr val="tx1"/>
+          </a:solidFill>
+          <a:latin typeface="+mn-lt"/>
+          <a:ea typeface="+mn-ea"/>
+          <a:cs typeface="+mn-cs"/>
+        </a:defRPr>
+      </a:lvl8pPr>
+      <a:lvl9pPr marL="3657600" algn="l" defTabSz="914400" rtl="0" eaLnBrk="1" latinLnBrk="0" hangingPunct="1">
+        <a:defRPr sz="1800" kern="1200">
+          <a:solidFill>
+            <a:schemeClr val="tx1"/>
+          </a:solidFill>
+          <a:latin typeface="+mn-lt"/>
+          <a:ea typeface="+mn-ea"/>
+          <a:cs typeface="+mn-cs"/>
+        </a:defRPr>
+      </a:lvl9pPr>
+    </p:otherStyle>
+  </p:txStyles>
 </p:sldMaster>
 </file>
 
 <file path=ppt/slides/slide1.xml><?xml version="1.0" encoding="utf-8"?>
-<p:sld xmlns:a="http://schemas.openxmlformats.org/drawingml/2006/main" xmlns:p="http://schemas.openxmlformats.org/presentationml/2006/main" xmlns:r="http://schemas.openxmlformats.org/officeDocument/2006/relationships" xmlns:p14="http://schemas.microsoft.com/office/powerpoint/2010/main" xmlns:p15="http://schemas.microsoft.com/office/powerpoint/2012/main" xmlns:mc="http://schemas.openxmlformats.org/markup-compatibility/2006">
+<p:sld xmlns:a="http://schemas.openxmlformats.org/drawingml/2006/main" xmlns:r="http://schemas.openxmlformats.org/officeDocument/2006/relationships" xmlns:p="http://schemas.openxmlformats.org/presentationml/2006/main">
   <p:cSld>
     <p:spTree>
       <p:nvGrpSpPr>
@@ -1703,16 +2160,22 @@
             </a:avLst>
           </a:prstGeom>
           <a:solidFill>
-            <a:srgbClr val="f2f2f2"/>
+            <a:srgbClr val="F2F2F2"/>
           </a:solidFill>
           <a:ln w="19080">
             <a:noFill/>
           </a:ln>
         </p:spPr>
         <p:style>
-          <a:lnRef idx="0"/>
-          <a:fillRef idx="0"/>
-          <a:effectRef idx="0"/>
+          <a:lnRef idx="0">
+            <a:scrgbClr r="0" g="0" b="0"/>
+          </a:lnRef>
+          <a:fillRef idx="0">
+            <a:scrgbClr r="0" g="0" b="0"/>
+          </a:fillRef>
+          <a:effectRef idx="0">
+            <a:scrgbClr r="0" g="0" b="0"/>
+          </a:effectRef>
           <a:fontRef idx="minor"/>
         </p:style>
       </p:sp>
@@ -1774,22 +2237,29 @@
             </a:avLst>
           </a:prstGeom>
           <a:solidFill>
-            <a:srgbClr val="6cc24a"/>
+            <a:srgbClr val="6CC24A"/>
           </a:solidFill>
           <a:ln>
             <a:noFill/>
           </a:ln>
         </p:spPr>
         <p:style>
-          <a:lnRef idx="0"/>
-          <a:fillRef idx="0"/>
-          <a:effectRef idx="0"/>
+          <a:lnRef idx="0">
+            <a:scrgbClr r="0" g="0" b="0"/>
+          </a:lnRef>
+          <a:fillRef idx="0">
+            <a:scrgbClr r="0" g="0" b="0"/>
+          </a:fillRef>
+          <a:effectRef idx="0">
+            <a:scrgbClr r="0" g="0" b="0"/>
+          </a:effectRef>
           <a:fontRef idx="minor"/>
         </p:style>
         <p:txBody>
-          <a:bodyPr lIns="90000" rIns="90000" tIns="45000" bIns="45000" anchor="ctr">
+          <a:bodyPr lIns="90000" tIns="45000" rIns="90000" bIns="45000" anchor="ctr">
             <a:noAutofit/>
           </a:bodyPr>
+          <a:lstStyle/>
           <a:p>
             <a:pPr algn="ctr">
               <a:lnSpc>
@@ -1797,15 +2267,15 @@
               </a:lnSpc>
             </a:pPr>
             <a:r>
-              <a:rPr b="0" lang="en-GB" sz="1100" spc="-1" strike="noStrike">
+              <a:rPr lang="en-GB" sz="1100" b="0" strike="noStrike" spc="-1">
                 <a:solidFill>
-                  <a:srgbClr val="ffffff"/>
+                  <a:srgbClr val="FFFFFF"/>
                 </a:solidFill>
                 <a:latin typeface="Source Sans Pro"/>
               </a:rPr>
               <a:t>Green thread 1</a:t>
             </a:r>
-            <a:endParaRPr b="0" lang="en-GB" sz="1100" spc="-1" strike="noStrike">
+            <a:endParaRPr lang="en-GB" sz="1100" b="0" strike="noStrike" spc="-1">
               <a:latin typeface="Arial"/>
             </a:endParaRPr>
           </a:p>
@@ -1829,22 +2299,29 @@
             </a:avLst>
           </a:prstGeom>
           <a:solidFill>
-            <a:srgbClr val="6cc24a"/>
+            <a:srgbClr val="6CC24A"/>
           </a:solidFill>
           <a:ln>
             <a:noFill/>
           </a:ln>
         </p:spPr>
         <p:style>
-          <a:lnRef idx="0"/>
-          <a:fillRef idx="0"/>
-          <a:effectRef idx="0"/>
+          <a:lnRef idx="0">
+            <a:scrgbClr r="0" g="0" b="0"/>
+          </a:lnRef>
+          <a:fillRef idx="0">
+            <a:scrgbClr r="0" g="0" b="0"/>
+          </a:fillRef>
+          <a:effectRef idx="0">
+            <a:scrgbClr r="0" g="0" b="0"/>
+          </a:effectRef>
           <a:fontRef idx="minor"/>
         </p:style>
         <p:txBody>
-          <a:bodyPr lIns="90000" rIns="90000" tIns="45000" bIns="45000" anchor="ctr">
+          <a:bodyPr lIns="90000" tIns="45000" rIns="90000" bIns="45000" anchor="ctr">
             <a:noAutofit/>
           </a:bodyPr>
+          <a:lstStyle/>
           <a:p>
             <a:pPr algn="ctr">
               <a:lnSpc>
@@ -1852,15 +2329,15 @@
               </a:lnSpc>
             </a:pPr>
             <a:r>
-              <a:rPr b="0" lang="en-GB" sz="1250" spc="-1" strike="noStrike">
+              <a:rPr lang="en-GB" sz="1250" b="0" strike="noStrike" spc="-1">
                 <a:solidFill>
-                  <a:srgbClr val="ffffff"/>
+                  <a:srgbClr val="FFFFFF"/>
                 </a:solidFill>
                 <a:latin typeface="Source Sans Pro"/>
               </a:rPr>
               <a:t>1</a:t>
             </a:r>
-            <a:endParaRPr b="0" lang="en-GB" sz="1250" spc="-1" strike="noStrike">
+            <a:endParaRPr lang="en-GB" sz="1250" b="0" strike="noStrike" spc="-1">
               <a:latin typeface="Arial"/>
             </a:endParaRPr>
           </a:p>
@@ -1884,22 +2361,29 @@
             </a:avLst>
           </a:prstGeom>
           <a:solidFill>
-            <a:srgbClr val="6cc24a"/>
+            <a:srgbClr val="6CC24A"/>
           </a:solidFill>
           <a:ln>
             <a:noFill/>
           </a:ln>
         </p:spPr>
         <p:style>
-          <a:lnRef idx="0"/>
-          <a:fillRef idx="0"/>
-          <a:effectRef idx="0"/>
+          <a:lnRef idx="0">
+            <a:scrgbClr r="0" g="0" b="0"/>
+          </a:lnRef>
+          <a:fillRef idx="0">
+            <a:scrgbClr r="0" g="0" b="0"/>
+          </a:fillRef>
+          <a:effectRef idx="0">
+            <a:scrgbClr r="0" g="0" b="0"/>
+          </a:effectRef>
           <a:fontRef idx="minor"/>
         </p:style>
         <p:txBody>
-          <a:bodyPr lIns="90000" rIns="90000" tIns="45000" bIns="45000" anchor="ctr">
+          <a:bodyPr lIns="90000" tIns="45000" rIns="90000" bIns="45000" anchor="ctr">
             <a:noAutofit/>
           </a:bodyPr>
+          <a:lstStyle/>
           <a:p>
             <a:pPr algn="ctr">
               <a:lnSpc>
@@ -1907,15 +2391,15 @@
               </a:lnSpc>
             </a:pPr>
             <a:r>
-              <a:rPr b="0" lang="en-GB" sz="1100" spc="-1" strike="noStrike">
+              <a:rPr lang="en-GB" sz="1100" b="0" strike="noStrike" spc="-1">
                 <a:solidFill>
-                  <a:srgbClr val="ffffff"/>
+                  <a:srgbClr val="FFFFFF"/>
                 </a:solidFill>
                 <a:latin typeface="Source Sans Pro"/>
               </a:rPr>
               <a:t>Green thread 2</a:t>
             </a:r>
-            <a:endParaRPr b="0" lang="en-GB" sz="1100" spc="-1" strike="noStrike">
+            <a:endParaRPr lang="en-GB" sz="1100" b="0" strike="noStrike" spc="-1">
               <a:latin typeface="Arial"/>
             </a:endParaRPr>
           </a:p>
@@ -1939,22 +2423,29 @@
             </a:avLst>
           </a:prstGeom>
           <a:solidFill>
-            <a:srgbClr val="6cc24a"/>
+            <a:srgbClr val="6CC24A"/>
           </a:solidFill>
           <a:ln>
             <a:noFill/>
           </a:ln>
         </p:spPr>
         <p:style>
-          <a:lnRef idx="0"/>
-          <a:fillRef idx="0"/>
-          <a:effectRef idx="0"/>
+          <a:lnRef idx="0">
+            <a:scrgbClr r="0" g="0" b="0"/>
+          </a:lnRef>
+          <a:fillRef idx="0">
+            <a:scrgbClr r="0" g="0" b="0"/>
+          </a:fillRef>
+          <a:effectRef idx="0">
+            <a:scrgbClr r="0" g="0" b="0"/>
+          </a:effectRef>
           <a:fontRef idx="minor"/>
         </p:style>
         <p:txBody>
-          <a:bodyPr lIns="90000" rIns="90000" tIns="45000" bIns="45000" anchor="ctr">
+          <a:bodyPr lIns="90000" tIns="45000" rIns="90000" bIns="45000" anchor="ctr">
             <a:noAutofit/>
           </a:bodyPr>
+          <a:lstStyle/>
           <a:p>
             <a:pPr algn="ctr">
               <a:lnSpc>
@@ -1962,15 +2453,15 @@
               </a:lnSpc>
             </a:pPr>
             <a:r>
-              <a:rPr b="0" lang="en-GB" sz="1250" spc="-1" strike="noStrike">
+              <a:rPr lang="en-GB" sz="1250" b="0" strike="noStrike" spc="-1">
                 <a:solidFill>
-                  <a:srgbClr val="ffffff"/>
+                  <a:srgbClr val="FFFFFF"/>
                 </a:solidFill>
                 <a:latin typeface="Source Sans Pro"/>
               </a:rPr>
               <a:t>2</a:t>
             </a:r>
-            <a:endParaRPr b="0" lang="en-GB" sz="1250" spc="-1" strike="noStrike">
+            <a:endParaRPr lang="en-GB" sz="1250" b="0" strike="noStrike" spc="-1">
               <a:latin typeface="Arial"/>
             </a:endParaRPr>
           </a:p>
@@ -1994,22 +2485,29 @@
             </a:avLst>
           </a:prstGeom>
           <a:solidFill>
-            <a:srgbClr val="6cc24a"/>
+            <a:srgbClr val="6CC24A"/>
           </a:solidFill>
           <a:ln>
             <a:noFill/>
           </a:ln>
         </p:spPr>
         <p:style>
-          <a:lnRef idx="0"/>
-          <a:fillRef idx="0"/>
-          <a:effectRef idx="0"/>
+          <a:lnRef idx="0">
+            <a:scrgbClr r="0" g="0" b="0"/>
+          </a:lnRef>
+          <a:fillRef idx="0">
+            <a:scrgbClr r="0" g="0" b="0"/>
+          </a:fillRef>
+          <a:effectRef idx="0">
+            <a:scrgbClr r="0" g="0" b="0"/>
+          </a:effectRef>
           <a:fontRef idx="minor"/>
         </p:style>
         <p:txBody>
-          <a:bodyPr lIns="90000" rIns="90000" tIns="45000" bIns="45000" anchor="ctr">
+          <a:bodyPr lIns="90000" tIns="45000" rIns="90000" bIns="45000" anchor="ctr">
             <a:noAutofit/>
           </a:bodyPr>
+          <a:lstStyle/>
           <a:p>
             <a:pPr algn="ctr">
               <a:lnSpc>
@@ -2017,15 +2515,15 @@
               </a:lnSpc>
             </a:pPr>
             <a:r>
-              <a:rPr b="0" lang="en-GB" sz="1100" spc="-1" strike="noStrike">
+              <a:rPr lang="en-GB" sz="1100" b="0" strike="noStrike" spc="-1">
                 <a:solidFill>
-                  <a:srgbClr val="ffffff"/>
+                  <a:srgbClr val="FFFFFF"/>
                 </a:solidFill>
                 <a:latin typeface="Source Sans Pro"/>
               </a:rPr>
               <a:t>Green thread 3</a:t>
             </a:r>
-            <a:endParaRPr b="0" lang="en-GB" sz="1100" spc="-1" strike="noStrike">
+            <a:endParaRPr lang="en-GB" sz="1100" b="0" strike="noStrike" spc="-1">
               <a:latin typeface="Arial"/>
             </a:endParaRPr>
           </a:p>
@@ -2049,22 +2547,29 @@
             </a:avLst>
           </a:prstGeom>
           <a:solidFill>
-            <a:srgbClr val="6cc24a"/>
+            <a:srgbClr val="6CC24A"/>
           </a:solidFill>
           <a:ln>
             <a:noFill/>
           </a:ln>
         </p:spPr>
         <p:style>
-          <a:lnRef idx="0"/>
-          <a:fillRef idx="0"/>
-          <a:effectRef idx="0"/>
+          <a:lnRef idx="0">
+            <a:scrgbClr r="0" g="0" b="0"/>
+          </a:lnRef>
+          <a:fillRef idx="0">
+            <a:scrgbClr r="0" g="0" b="0"/>
+          </a:fillRef>
+          <a:effectRef idx="0">
+            <a:scrgbClr r="0" g="0" b="0"/>
+          </a:effectRef>
           <a:fontRef idx="minor"/>
         </p:style>
         <p:txBody>
-          <a:bodyPr lIns="90000" rIns="90000" tIns="45000" bIns="45000" anchor="ctr">
+          <a:bodyPr lIns="90000" tIns="45000" rIns="90000" bIns="45000" anchor="ctr">
             <a:noAutofit/>
           </a:bodyPr>
+          <a:lstStyle/>
           <a:p>
             <a:pPr algn="ctr">
               <a:lnSpc>
@@ -2072,15 +2577,15 @@
               </a:lnSpc>
             </a:pPr>
             <a:r>
-              <a:rPr b="0" lang="en-GB" sz="1250" spc="-1" strike="noStrike">
+              <a:rPr lang="en-GB" sz="1250" b="0" strike="noStrike" spc="-1">
                 <a:solidFill>
-                  <a:srgbClr val="ffffff"/>
+                  <a:srgbClr val="FFFFFF"/>
                 </a:solidFill>
                 <a:latin typeface="Source Sans Pro"/>
               </a:rPr>
               <a:t>3</a:t>
             </a:r>
-            <a:endParaRPr b="0" lang="en-GB" sz="1250" spc="-1" strike="noStrike">
+            <a:endParaRPr lang="en-GB" sz="1250" b="0" strike="noStrike" spc="-1">
               <a:latin typeface="Arial"/>
             </a:endParaRPr>
           </a:p>
@@ -2104,16 +2609,22 @@
             </a:avLst>
           </a:prstGeom>
           <a:solidFill>
-            <a:srgbClr val="ee502e"/>
+            <a:srgbClr val="EE502E"/>
           </a:solidFill>
           <a:ln>
             <a:noFill/>
           </a:ln>
         </p:spPr>
         <p:style>
-          <a:lnRef idx="0"/>
-          <a:fillRef idx="0"/>
-          <a:effectRef idx="0"/>
+          <a:lnRef idx="0">
+            <a:scrgbClr r="0" g="0" b="0"/>
+          </a:lnRef>
+          <a:fillRef idx="0">
+            <a:scrgbClr r="0" g="0" b="0"/>
+          </a:fillRef>
+          <a:effectRef idx="0">
+            <a:scrgbClr r="0" g="0" b="0"/>
+          </a:effectRef>
           <a:fontRef idx="minor"/>
         </p:style>
       </p:sp>
@@ -2135,16 +2646,22 @@
             </a:avLst>
           </a:prstGeom>
           <a:solidFill>
-            <a:srgbClr val="ee502e"/>
+            <a:srgbClr val="EE502E"/>
           </a:solidFill>
           <a:ln>
             <a:noFill/>
           </a:ln>
         </p:spPr>
         <p:style>
-          <a:lnRef idx="0"/>
-          <a:fillRef idx="0"/>
-          <a:effectRef idx="0"/>
+          <a:lnRef idx="0">
+            <a:scrgbClr r="0" g="0" b="0"/>
+          </a:lnRef>
+          <a:fillRef idx="0">
+            <a:scrgbClr r="0" g="0" b="0"/>
+          </a:fillRef>
+          <a:effectRef idx="0">
+            <a:scrgbClr r="0" g="0" b="0"/>
+          </a:effectRef>
           <a:fontRef idx="minor"/>
         </p:style>
       </p:sp>
@@ -2164,16 +2681,22 @@
           </a:prstGeom>
           <a:ln w="28440">
             <a:solidFill>
-              <a:srgbClr val="a9b1b5"/>
+              <a:srgbClr val="A9B1B5"/>
             </a:solidFill>
             <a:round/>
-            <a:tailEnd len="med" type="triangle" w="med"/>
+            <a:tailEnd type="triangle" w="med" len="med"/>
           </a:ln>
         </p:spPr>
         <p:style>
-          <a:lnRef idx="0"/>
-          <a:fillRef idx="0"/>
-          <a:effectRef idx="0"/>
+          <a:lnRef idx="0">
+            <a:scrgbClr r="0" g="0" b="0"/>
+          </a:lnRef>
+          <a:fillRef idx="0">
+            <a:scrgbClr r="0" g="0" b="0"/>
+          </a:fillRef>
+          <a:effectRef idx="0">
+            <a:scrgbClr r="0" g="0" b="0"/>
+          </a:effectRef>
           <a:fontRef idx="minor"/>
         </p:style>
       </p:sp>
@@ -2193,16 +2716,22 @@
           </a:prstGeom>
           <a:ln w="28440">
             <a:solidFill>
-              <a:srgbClr val="a9b1b5"/>
+              <a:srgbClr val="A9B1B5"/>
             </a:solidFill>
             <a:round/>
-            <a:tailEnd len="med" type="triangle" w="med"/>
+            <a:tailEnd type="triangle" w="med" len="med"/>
           </a:ln>
         </p:spPr>
         <p:style>
-          <a:lnRef idx="0"/>
-          <a:fillRef idx="0"/>
-          <a:effectRef idx="0"/>
+          <a:lnRef idx="0">
+            <a:scrgbClr r="0" g="0" b="0"/>
+          </a:lnRef>
+          <a:fillRef idx="0">
+            <a:scrgbClr r="0" g="0" b="0"/>
+          </a:fillRef>
+          <a:effectRef idx="0">
+            <a:scrgbClr r="0" g="0" b="0"/>
+          </a:effectRef>
           <a:fontRef idx="minor"/>
         </p:style>
       </p:sp>
@@ -2222,16 +2751,22 @@
           </a:prstGeom>
           <a:ln w="28440">
             <a:solidFill>
-              <a:srgbClr val="a9b1b5"/>
+              <a:srgbClr val="A9B1B5"/>
             </a:solidFill>
             <a:round/>
-            <a:tailEnd len="med" type="triangle" w="med"/>
+            <a:tailEnd type="triangle" w="med" len="med"/>
           </a:ln>
         </p:spPr>
         <p:style>
-          <a:lnRef idx="0"/>
-          <a:fillRef idx="0"/>
-          <a:effectRef idx="0"/>
+          <a:lnRef idx="0">
+            <a:scrgbClr r="0" g="0" b="0"/>
+          </a:lnRef>
+          <a:fillRef idx="0">
+            <a:scrgbClr r="0" g="0" b="0"/>
+          </a:fillRef>
+          <a:effectRef idx="0">
+            <a:scrgbClr r="0" g="0" b="0"/>
+          </a:effectRef>
           <a:fontRef idx="minor"/>
         </p:style>
       </p:sp>
@@ -2244,7 +2779,7 @@
         <p:spPr>
           <a:xfrm>
             <a:off x="3372480" y="4282920"/>
-            <a:ext cx="1929240" cy="455400"/>
+            <a:ext cx="1929240" cy="460211"/>
           </a:xfrm>
           <a:prstGeom prst="rect">
             <a:avLst/>
@@ -2255,15 +2790,22 @@
           </a:ln>
         </p:spPr>
         <p:style>
-          <a:lnRef idx="0"/>
-          <a:fillRef idx="0"/>
-          <a:effectRef idx="0"/>
+          <a:lnRef idx="0">
+            <a:scrgbClr r="0" g="0" b="0"/>
+          </a:lnRef>
+          <a:fillRef idx="0">
+            <a:scrgbClr r="0" g="0" b="0"/>
+          </a:fillRef>
+          <a:effectRef idx="0">
+            <a:scrgbClr r="0" g="0" b="0"/>
+          </a:effectRef>
           <a:fontRef idx="minor"/>
         </p:style>
         <p:txBody>
-          <a:bodyPr lIns="108000" rIns="108000" tIns="45000" bIns="45000">
+          <a:bodyPr lIns="108000" tIns="45000" rIns="108000" bIns="45000">
             <a:spAutoFit/>
           </a:bodyPr>
+          <a:lstStyle/>
           <a:p>
             <a:pPr algn="ctr">
               <a:lnSpc>
@@ -2271,18 +2813,15 @@
               </a:lnSpc>
             </a:pPr>
             <a:r>
-              <a:rPr b="1" lang="en-GB" sz="1200" spc="-1" strike="noStrike">
+              <a:rPr lang="en-GB" sz="1200" b="1" strike="noStrike" spc="-1" dirty="0">
                 <a:solidFill>
-                  <a:srgbClr val="4b5357"/>
+                  <a:srgbClr val="4B5357"/>
                 </a:solidFill>
                 <a:latin typeface="Source Sans Pro Light"/>
                 <a:ea typeface="Source Sans Pro Light"/>
               </a:rPr>
-              <a:t>The Java </a:t>
+              <a:t>Core Engine </a:t>
             </a:r>
-            <a:endParaRPr b="0" lang="en-GB" sz="1200" spc="-1" strike="noStrike">
-              <a:latin typeface="Arial"/>
-            </a:endParaRPr>
           </a:p>
           <a:p>
             <a:pPr algn="ctr">
@@ -2291,16 +2830,16 @@
               </a:lnSpc>
             </a:pPr>
             <a:r>
-              <a:rPr b="1" lang="en-GB" sz="1200" spc="-1" strike="noStrike">
+              <a:rPr lang="en-GB" sz="1200" b="1" strike="noStrike" spc="-1" dirty="0">
                 <a:solidFill>
-                  <a:srgbClr val="4b5357"/>
+                  <a:srgbClr val="4B5357"/>
                 </a:solidFill>
                 <a:latin typeface="Source Sans Pro Light"/>
                 <a:ea typeface="Source Sans Pro Light"/>
               </a:rPr>
-              <a:t>RTOS task</a:t>
+              <a:t>Task</a:t>
             </a:r>
-            <a:endParaRPr b="0" lang="en-GB" sz="1200" spc="-1" strike="noStrike">
+            <a:endParaRPr lang="en-GB" sz="1200" b="0" strike="noStrike" spc="-1" dirty="0">
               <a:latin typeface="Arial"/>
             </a:endParaRPr>
           </a:p>
@@ -2315,7 +2854,7 @@
         <p:spPr>
           <a:xfrm>
             <a:off x="8451720" y="4282920"/>
-            <a:ext cx="867960" cy="455400"/>
+            <a:ext cx="867960" cy="460211"/>
           </a:xfrm>
           <a:prstGeom prst="rect">
             <a:avLst/>
@@ -2326,15 +2865,22 @@
           </a:ln>
         </p:spPr>
         <p:style>
-          <a:lnRef idx="0"/>
-          <a:fillRef idx="0"/>
-          <a:effectRef idx="0"/>
+          <a:lnRef idx="0">
+            <a:scrgbClr r="0" g="0" b="0"/>
+          </a:lnRef>
+          <a:fillRef idx="0">
+            <a:scrgbClr r="0" g="0" b="0"/>
+          </a:fillRef>
+          <a:effectRef idx="0">
+            <a:scrgbClr r="0" g="0" b="0"/>
+          </a:effectRef>
           <a:fontRef idx="minor"/>
         </p:style>
         <p:txBody>
-          <a:bodyPr lIns="108000" rIns="108000" tIns="45000" bIns="45000">
+          <a:bodyPr lIns="108000" tIns="45000" rIns="108000" bIns="45000">
             <a:spAutoFit/>
           </a:bodyPr>
+          <a:lstStyle/>
           <a:p>
             <a:pPr algn="ctr">
               <a:lnSpc>
@@ -2342,16 +2888,16 @@
               </a:lnSpc>
             </a:pPr>
             <a:r>
-              <a:rPr b="1" lang="en-GB" sz="1200" spc="-1" strike="noStrike">
+              <a:rPr lang="en-GB" sz="1200" b="1" strike="noStrike" spc="-1" dirty="0">
                 <a:solidFill>
-                  <a:srgbClr val="4b5357"/>
+                  <a:srgbClr val="4B5357"/>
                 </a:solidFill>
                 <a:latin typeface="Source Sans Pro Light"/>
                 <a:ea typeface="Source Sans Pro Light"/>
               </a:rPr>
               <a:t>Another C</a:t>
             </a:r>
-            <a:endParaRPr b="0" lang="en-GB" sz="1200" spc="-1" strike="noStrike">
+            <a:endParaRPr lang="en-GB" sz="1200" b="0" strike="noStrike" spc="-1" dirty="0">
               <a:latin typeface="Arial"/>
             </a:endParaRPr>
           </a:p>
@@ -2362,16 +2908,16 @@
               </a:lnSpc>
             </a:pPr>
             <a:r>
-              <a:rPr b="1" lang="en-GB" sz="1200" spc="-1" strike="noStrike">
+              <a:rPr lang="en-GB" sz="1200" b="1" strike="noStrike" spc="-1" dirty="0">
                 <a:solidFill>
-                  <a:srgbClr val="4b5357"/>
+                  <a:srgbClr val="4B5357"/>
                 </a:solidFill>
                 <a:latin typeface="Source Sans Pro Light"/>
                 <a:ea typeface="Source Sans Pro Light"/>
               </a:rPr>
-              <a:t>RTOS task</a:t>
+              <a:t>Task</a:t>
             </a:r>
-            <a:endParaRPr b="0" lang="en-GB" sz="1200" spc="-1" strike="noStrike">
+            <a:endParaRPr lang="en-GB" sz="1200" b="0" strike="noStrike" spc="-1" dirty="0">
               <a:latin typeface="Arial"/>
             </a:endParaRPr>
           </a:p>
@@ -2397,15 +2943,22 @@
           </a:ln>
         </p:spPr>
         <p:style>
-          <a:lnRef idx="0"/>
-          <a:fillRef idx="0"/>
-          <a:effectRef idx="0"/>
+          <a:lnRef idx="0">
+            <a:scrgbClr r="0" g="0" b="0"/>
+          </a:lnRef>
+          <a:fillRef idx="0">
+            <a:scrgbClr r="0" g="0" b="0"/>
+          </a:fillRef>
+          <a:effectRef idx="0">
+            <a:scrgbClr r="0" g="0" b="0"/>
+          </a:effectRef>
           <a:fontRef idx="minor"/>
         </p:style>
         <p:txBody>
-          <a:bodyPr lIns="108000" rIns="108000" tIns="45000" bIns="45000">
+          <a:bodyPr lIns="108000" tIns="45000" rIns="108000" bIns="45000">
             <a:spAutoFit/>
           </a:bodyPr>
+          <a:lstStyle/>
           <a:p>
             <a:pPr algn="ctr">
               <a:lnSpc>
@@ -2413,16 +2966,16 @@
               </a:lnSpc>
             </a:pPr>
             <a:r>
-              <a:rPr b="0" lang="en-GB" sz="1050" spc="-1" strike="noStrike">
+              <a:rPr lang="en-GB" sz="1050" b="0" strike="noStrike" spc="-1">
                 <a:solidFill>
-                  <a:srgbClr val="4b5357"/>
+                  <a:srgbClr val="4B5357"/>
                 </a:solidFill>
                 <a:latin typeface="Consolas"/>
                 <a:ea typeface="Source Sans Pro Light"/>
               </a:rPr>
               <a:t>SNI_getCurrentJavaThreadID() : 3</a:t>
             </a:r>
-            <a:endParaRPr b="0" lang="en-GB" sz="1050" spc="-1" strike="noStrike">
+            <a:endParaRPr lang="en-GB" sz="1050" b="0" strike="noStrike" spc="-1">
               <a:latin typeface="Arial"/>
             </a:endParaRPr>
           </a:p>
@@ -2448,15 +3001,22 @@
           </a:ln>
         </p:spPr>
         <p:style>
-          <a:lnRef idx="0"/>
-          <a:fillRef idx="0"/>
-          <a:effectRef idx="0"/>
+          <a:lnRef idx="0">
+            <a:scrgbClr r="0" g="0" b="0"/>
+          </a:lnRef>
+          <a:fillRef idx="0">
+            <a:scrgbClr r="0" g="0" b="0"/>
+          </a:fillRef>
+          <a:effectRef idx="0">
+            <a:scrgbClr r="0" g="0" b="0"/>
+          </a:effectRef>
           <a:fontRef idx="minor"/>
         </p:style>
         <p:txBody>
-          <a:bodyPr lIns="108000" rIns="108000" tIns="45000" bIns="45000">
+          <a:bodyPr lIns="108000" tIns="45000" rIns="108000" bIns="45000">
             <a:spAutoFit/>
           </a:bodyPr>
+          <a:lstStyle/>
           <a:p>
             <a:pPr algn="ctr">
               <a:lnSpc>
@@ -2464,16 +3024,16 @@
               </a:lnSpc>
             </a:pPr>
             <a:r>
-              <a:rPr b="0" lang="en-GB" sz="1050" spc="-1" strike="noStrike">
+              <a:rPr lang="en-GB" sz="1050" b="0" strike="noStrike" spc="-1">
                 <a:solidFill>
-                  <a:srgbClr val="4b5357"/>
+                  <a:srgbClr val="4B5357"/>
                 </a:solidFill>
                 <a:latin typeface="Consolas"/>
                 <a:ea typeface="Source Sans Pro Light"/>
               </a:rPr>
               <a:t>SNI_suspendCurrentJavaThread(…)</a:t>
             </a:r>
-            <a:endParaRPr b="0" lang="en-GB" sz="1050" spc="-1" strike="noStrike">
+            <a:endParaRPr lang="en-GB" sz="1050" b="0" strike="noStrike" spc="-1">
               <a:latin typeface="Arial"/>
             </a:endParaRPr>
           </a:p>
@@ -2499,15 +3059,22 @@
           </a:ln>
         </p:spPr>
         <p:style>
-          <a:lnRef idx="0"/>
-          <a:fillRef idx="0"/>
-          <a:effectRef idx="0"/>
+          <a:lnRef idx="0">
+            <a:scrgbClr r="0" g="0" b="0"/>
+          </a:lnRef>
+          <a:fillRef idx="0">
+            <a:scrgbClr r="0" g="0" b="0"/>
+          </a:fillRef>
+          <a:effectRef idx="0">
+            <a:scrgbClr r="0" g="0" b="0"/>
+          </a:effectRef>
           <a:fontRef idx="minor"/>
         </p:style>
         <p:txBody>
-          <a:bodyPr lIns="108000" rIns="108000" tIns="45000" bIns="45000">
+          <a:bodyPr lIns="108000" tIns="45000" rIns="108000" bIns="45000">
             <a:spAutoFit/>
           </a:bodyPr>
+          <a:lstStyle/>
           <a:p>
             <a:pPr algn="ctr">
               <a:lnSpc>
@@ -2515,16 +3082,16 @@
               </a:lnSpc>
             </a:pPr>
             <a:r>
-              <a:rPr b="0" lang="en-GB" sz="1050" spc="-1" strike="noStrike">
+              <a:rPr lang="en-GB" sz="1050" b="0" strike="noStrike" spc="-1">
                 <a:solidFill>
-                  <a:srgbClr val="4b5357"/>
+                  <a:srgbClr val="4B5357"/>
                 </a:solidFill>
                 <a:latin typeface="Consolas"/>
                 <a:ea typeface="Source Sans Pro Light"/>
               </a:rPr>
               <a:t>SNI_resumeJavaThread(3)</a:t>
             </a:r>
-            <a:endParaRPr b="0" lang="en-GB" sz="1050" spc="-1" strike="noStrike">
+            <a:endParaRPr lang="en-GB" sz="1050" b="0" strike="noStrike" spc="-1">
               <a:latin typeface="Arial"/>
             </a:endParaRPr>
           </a:p>
@@ -2546,16 +3113,22 @@
           </a:prstGeom>
           <a:ln w="28440">
             <a:solidFill>
-              <a:srgbClr val="a9b1b5"/>
+              <a:srgbClr val="A9B1B5"/>
             </a:solidFill>
             <a:round/>
-            <a:tailEnd len="med" type="oval" w="med"/>
+            <a:tailEnd type="oval" w="med" len="med"/>
           </a:ln>
         </p:spPr>
         <p:style>
-          <a:lnRef idx="0"/>
-          <a:fillRef idx="0"/>
-          <a:effectRef idx="0"/>
+          <a:lnRef idx="0">
+            <a:scrgbClr r="0" g="0" b="0"/>
+          </a:lnRef>
+          <a:fillRef idx="0">
+            <a:scrgbClr r="0" g="0" b="0"/>
+          </a:fillRef>
+          <a:effectRef idx="0">
+            <a:scrgbClr r="0" g="0" b="0"/>
+          </a:effectRef>
           <a:fontRef idx="minor"/>
         </p:style>
       </p:sp>
@@ -2575,16 +3148,22 @@
           </a:prstGeom>
           <a:ln w="28440">
             <a:solidFill>
-              <a:srgbClr val="a9b1b5"/>
+              <a:srgbClr val="A9B1B5"/>
             </a:solidFill>
             <a:round/>
-            <a:tailEnd len="med" type="oval" w="med"/>
+            <a:tailEnd type="oval" w="med" len="med"/>
           </a:ln>
         </p:spPr>
         <p:style>
-          <a:lnRef idx="0"/>
-          <a:fillRef idx="0"/>
-          <a:effectRef idx="0"/>
+          <a:lnRef idx="0">
+            <a:scrgbClr r="0" g="0" b="0"/>
+          </a:lnRef>
+          <a:fillRef idx="0">
+            <a:scrgbClr r="0" g="0" b="0"/>
+          </a:fillRef>
+          <a:effectRef idx="0">
+            <a:scrgbClr r="0" g="0" b="0"/>
+          </a:effectRef>
           <a:fontRef idx="minor"/>
         </p:style>
       </p:sp>
@@ -2604,16 +3183,22 @@
           </a:prstGeom>
           <a:ln w="28440">
             <a:solidFill>
-              <a:srgbClr val="a9b1b5"/>
+              <a:srgbClr val="A9B1B5"/>
             </a:solidFill>
             <a:round/>
-            <a:tailEnd len="med" type="oval" w="med"/>
+            <a:tailEnd type="oval" w="med" len="med"/>
           </a:ln>
         </p:spPr>
         <p:style>
-          <a:lnRef idx="0"/>
-          <a:fillRef idx="0"/>
-          <a:effectRef idx="0"/>
+          <a:lnRef idx="0">
+            <a:scrgbClr r="0" g="0" b="0"/>
+          </a:lnRef>
+          <a:fillRef idx="0">
+            <a:scrgbClr r="0" g="0" b="0"/>
+          </a:fillRef>
+          <a:effectRef idx="0">
+            <a:scrgbClr r="0" g="0" b="0"/>
+          </a:effectRef>
           <a:fontRef idx="minor"/>
         </p:style>
       </p:sp>
@@ -2635,22 +3220,29 @@
             </a:avLst>
           </a:prstGeom>
           <a:solidFill>
-            <a:srgbClr val="717d83"/>
+            <a:srgbClr val="717D83"/>
           </a:solidFill>
           <a:ln>
             <a:noFill/>
           </a:ln>
         </p:spPr>
         <p:style>
-          <a:lnRef idx="0"/>
-          <a:fillRef idx="0"/>
-          <a:effectRef idx="0"/>
+          <a:lnRef idx="0">
+            <a:scrgbClr r="0" g="0" b="0"/>
+          </a:lnRef>
+          <a:fillRef idx="0">
+            <a:scrgbClr r="0" g="0" b="0"/>
+          </a:fillRef>
+          <a:effectRef idx="0">
+            <a:scrgbClr r="0" g="0" b="0"/>
+          </a:effectRef>
           <a:fontRef idx="minor"/>
         </p:style>
         <p:txBody>
-          <a:bodyPr lIns="90000" rIns="90000" tIns="45000" bIns="45000" anchor="ctr">
+          <a:bodyPr lIns="90000" tIns="45000" rIns="90000" bIns="45000" anchor="ctr">
             <a:noAutofit/>
           </a:bodyPr>
+          <a:lstStyle/>
           <a:p>
             <a:pPr algn="ctr">
               <a:lnSpc>
@@ -2658,15 +3250,15 @@
               </a:lnSpc>
             </a:pPr>
             <a:r>
-              <a:rPr b="0" lang="en-GB" sz="1050" spc="-1" strike="noStrike">
+              <a:rPr lang="en-GB" sz="1050" b="0" strike="noStrike" spc="-1">
                 <a:solidFill>
-                  <a:srgbClr val="ffffff"/>
+                  <a:srgbClr val="FFFFFF"/>
                 </a:solidFill>
                 <a:latin typeface="Source Sans Pro"/>
               </a:rPr>
               <a:t>Time</a:t>
             </a:r>
-            <a:endParaRPr b="0" lang="en-GB" sz="1050" spc="-1" strike="noStrike">
+            <a:endParaRPr lang="en-GB" sz="1050" b="0" strike="noStrike" spc="-1">
               <a:latin typeface="Arial"/>
             </a:endParaRPr>
           </a:p>
@@ -2674,14 +3266,9 @@
       </p:sp>
     </p:spTree>
   </p:cSld>
-  <mc:AlternateContent>
-    <mc:Choice Requires="p14">
-      <p:transition spd="slow" p14:dur="2000"/>
-    </mc:Choice>
-    <mc:Fallback>
-      <p:transition spd="slow"/>
-    </mc:Fallback>
-  </mc:AlternateContent>
+  <p:clrMapOvr>
+    <a:masterClrMapping/>
+  </p:clrMapOvr>
   <p:timing>
     <p:tnLst>
       <p:par>
@@ -2690,14 +3277,14 @@
             <p:seq>
               <p:cTn id="2" dur="indefinite" nodeType="mainSeq"/>
               <p:prevCondLst>
-                <p:cond delay="0" evt="onPrev">
+                <p:cond evt="onPrev" delay="0">
                   <p:tgtEl>
                     <p:sldTgt/>
                   </p:tgtEl>
                 </p:cond>
               </p:prevCondLst>
               <p:nextCondLst>
-                <p:cond delay="0" evt="onNext">
+                <p:cond evt="onNext" delay="0">
                   <p:tgtEl>
                     <p:sldTgt/>
                   </p:tgtEl>
@@ -2723,34 +3310,34 @@
         <a:sysClr val="window" lastClr="FFFFFF"/>
       </a:lt1>
       <a:dk2>
-        <a:srgbClr val="44546a"/>
+        <a:srgbClr val="44546A"/>
       </a:dk2>
       <a:lt2>
-        <a:srgbClr val="e7e6e6"/>
+        <a:srgbClr val="E7E6E6"/>
       </a:lt2>
       <a:accent1>
-        <a:srgbClr val="4472c4"/>
+        <a:srgbClr val="4472C4"/>
       </a:accent1>
       <a:accent2>
-        <a:srgbClr val="ed7d31"/>
+        <a:srgbClr val="ED7D31"/>
       </a:accent2>
       <a:accent3>
-        <a:srgbClr val="a5a5a5"/>
+        <a:srgbClr val="A5A5A5"/>
       </a:accent3>
       <a:accent4>
-        <a:srgbClr val="ffc000"/>
+        <a:srgbClr val="FFC000"/>
       </a:accent4>
       <a:accent5>
-        <a:srgbClr val="5b9bd5"/>
+        <a:srgbClr val="5B9BD5"/>
       </a:accent5>
       <a:accent6>
-        <a:srgbClr val="70ad47"/>
+        <a:srgbClr val="70AD47"/>
       </a:accent6>
       <a:hlink>
-        <a:srgbClr val="0563c1"/>
+        <a:srgbClr val="0563C1"/>
       </a:hlink>
       <a:folHlink>
-        <a:srgbClr val="954f72"/>
+        <a:srgbClr val="954F72"/>
       </a:folHlink>
     </a:clrScheme>
     <a:fontScheme name="Office">
@@ -2932,5 +3519,7 @@
       </a:bgFillStyleLst>
     </a:fmtScheme>
   </a:themeElements>
+  <a:objectDefaults/>
+  <a:extraClrSchemeLst/>
 </a:theme>
 </file>
</xml_diff>